<commit_message>
Major slide work, some code reorg, nothing major here
</commit_message>
<xml_diff>
--- a/presentations/chadmyers/InternalDSLs/doc/Internal Domain-specific Languages in CSharp.pptx
+++ b/presentations/chadmyers/InternalDSLs/doc/Internal Domain-specific Languages in CSharp.pptx
@@ -14,7 +14,19 @@
     <p:sldId id="263" r:id="rId8"/>
     <p:sldId id="262" r:id="rId9"/>
     <p:sldId id="264" r:id="rId10"/>
-    <p:sldId id="265" r:id="rId11"/>
+    <p:sldId id="269" r:id="rId11"/>
+    <p:sldId id="270" r:id="rId12"/>
+    <p:sldId id="271" r:id="rId13"/>
+    <p:sldId id="272" r:id="rId14"/>
+    <p:sldId id="273" r:id="rId15"/>
+    <p:sldId id="274" r:id="rId16"/>
+    <p:sldId id="275" r:id="rId17"/>
+    <p:sldId id="265" r:id="rId18"/>
+    <p:sldId id="266" r:id="rId19"/>
+    <p:sldId id="268" r:id="rId20"/>
+    <p:sldId id="267" r:id="rId21"/>
+    <p:sldId id="278" r:id="rId22"/>
+    <p:sldId id="276" r:id="rId23"/>
   </p:sldIdLst>
   <p:sldSz cx="9144000" cy="6858000" type="screen4x3"/>
   <p:notesSz cx="6858000" cy="9144000"/>
@@ -741,7 +753,8 @@
           <a:p>
             <a:fld id="{5B190AD6-4DB3-4C5C-B19D-6B7C31FD5945}" type="datetimeFigureOut">
               <a:rPr lang="en-US" smtClean="0"/>
-              <a:t>10/27/2008</a:t>
+              <a:pPr/>
+              <a:t>10/28/2008</a:t>
             </a:fld>
             <a:endParaRPr lang="en-US"/>
           </a:p>
@@ -803,6 +816,7 @@
           <a:p>
             <a:fld id="{0034AAF4-FE8C-49D5-89B2-BA2E4A9E67A6}" type="slidenum">
               <a:rPr lang="en-US" smtClean="0"/>
+              <a:pPr/>
               <a:t>‹#›</a:t>
             </a:fld>
             <a:endParaRPr lang="en-US"/>
@@ -937,7 +951,8 @@
           <a:p>
             <a:fld id="{5B190AD6-4DB3-4C5C-B19D-6B7C31FD5945}" type="datetimeFigureOut">
               <a:rPr lang="en-US" smtClean="0"/>
-              <a:t>10/27/2008</a:t>
+              <a:pPr/>
+              <a:t>10/28/2008</a:t>
             </a:fld>
             <a:endParaRPr lang="en-US"/>
           </a:p>
@@ -983,6 +998,7 @@
           <a:p>
             <a:fld id="{0034AAF4-FE8C-49D5-89B2-BA2E4A9E67A6}" type="slidenum">
               <a:rPr lang="en-US" smtClean="0"/>
+              <a:pPr/>
               <a:t>‹#›</a:t>
             </a:fld>
             <a:endParaRPr lang="en-US"/>
@@ -1122,7 +1138,8 @@
           <a:p>
             <a:fld id="{5B190AD6-4DB3-4C5C-B19D-6B7C31FD5945}" type="datetimeFigureOut">
               <a:rPr lang="en-US" smtClean="0"/>
-              <a:t>10/27/2008</a:t>
+              <a:pPr/>
+              <a:t>10/28/2008</a:t>
             </a:fld>
             <a:endParaRPr lang="en-US"/>
           </a:p>
@@ -1168,6 +1185,7 @@
           <a:p>
             <a:fld id="{0034AAF4-FE8C-49D5-89B2-BA2E4A9E67A6}" type="slidenum">
               <a:rPr lang="en-US" smtClean="0"/>
+              <a:pPr/>
               <a:t>‹#›</a:t>
             </a:fld>
             <a:endParaRPr lang="en-US"/>
@@ -1272,7 +1290,8 @@
           <a:p>
             <a:fld id="{5B190AD6-4DB3-4C5C-B19D-6B7C31FD5945}" type="datetimeFigureOut">
               <a:rPr lang="en-US" smtClean="0"/>
-              <a:t>10/27/2008</a:t>
+              <a:pPr/>
+              <a:t>10/28/2008</a:t>
             </a:fld>
             <a:endParaRPr lang="en-US"/>
           </a:p>
@@ -1318,6 +1337,7 @@
           <a:p>
             <a:fld id="{0034AAF4-FE8C-49D5-89B2-BA2E4A9E67A6}" type="slidenum">
               <a:rPr lang="en-US" smtClean="0"/>
+              <a:pPr/>
               <a:t>‹#›</a:t>
             </a:fld>
             <a:endParaRPr lang="en-US"/>
@@ -1527,7 +1547,8 @@
           <a:p>
             <a:fld id="{5B190AD6-4DB3-4C5C-B19D-6B7C31FD5945}" type="datetimeFigureOut">
               <a:rPr lang="en-US" smtClean="0"/>
-              <a:t>10/27/2008</a:t>
+              <a:pPr/>
+              <a:t>10/28/2008</a:t>
             </a:fld>
             <a:endParaRPr lang="en-US"/>
           </a:p>
@@ -1573,6 +1594,7 @@
           <a:p>
             <a:fld id="{0034AAF4-FE8C-49D5-89B2-BA2E4A9E67A6}" type="slidenum">
               <a:rPr lang="en-US" smtClean="0"/>
+              <a:pPr/>
               <a:t>‹#›</a:t>
             </a:fld>
             <a:endParaRPr lang="en-US"/>
@@ -1936,7 +1958,8 @@
           <a:p>
             <a:fld id="{5B190AD6-4DB3-4C5C-B19D-6B7C31FD5945}" type="datetimeFigureOut">
               <a:rPr lang="en-US" smtClean="0"/>
-              <a:t>10/27/2008</a:t>
+              <a:pPr/>
+              <a:t>10/28/2008</a:t>
             </a:fld>
             <a:endParaRPr lang="en-US"/>
           </a:p>
@@ -1982,6 +2005,7 @@
           <a:p>
             <a:fld id="{0034AAF4-FE8C-49D5-89B2-BA2E4A9E67A6}" type="slidenum">
               <a:rPr lang="en-US" smtClean="0"/>
+              <a:pPr/>
               <a:t>‹#›</a:t>
             </a:fld>
             <a:endParaRPr lang="en-US"/>
@@ -2382,7 +2406,8 @@
           <a:p>
             <a:fld id="{5B190AD6-4DB3-4C5C-B19D-6B7C31FD5945}" type="datetimeFigureOut">
               <a:rPr lang="en-US" smtClean="0"/>
-              <a:t>10/27/2008</a:t>
+              <a:pPr/>
+              <a:t>10/28/2008</a:t>
             </a:fld>
             <a:endParaRPr lang="en-US"/>
           </a:p>
@@ -2428,6 +2453,7 @@
           <a:p>
             <a:fld id="{0034AAF4-FE8C-49D5-89B2-BA2E4A9E67A6}" type="slidenum">
               <a:rPr lang="en-US" smtClean="0"/>
+              <a:pPr/>
               <a:t>‹#›</a:t>
             </a:fld>
             <a:endParaRPr lang="en-US"/>
@@ -2483,7 +2509,8 @@
           <a:p>
             <a:fld id="{5B190AD6-4DB3-4C5C-B19D-6B7C31FD5945}" type="datetimeFigureOut">
               <a:rPr lang="en-US" smtClean="0"/>
-              <a:t>10/27/2008</a:t>
+              <a:pPr/>
+              <a:t>10/28/2008</a:t>
             </a:fld>
             <a:endParaRPr lang="en-US"/>
           </a:p>
@@ -2529,6 +2556,7 @@
           <a:p>
             <a:fld id="{0034AAF4-FE8C-49D5-89B2-BA2E4A9E67A6}" type="slidenum">
               <a:rPr lang="en-US" smtClean="0"/>
+              <a:pPr/>
               <a:t>‹#›</a:t>
             </a:fld>
             <a:endParaRPr lang="en-US"/>
@@ -2604,7 +2632,8 @@
           <a:p>
             <a:fld id="{5B190AD6-4DB3-4C5C-B19D-6B7C31FD5945}" type="datetimeFigureOut">
               <a:rPr lang="en-US" smtClean="0"/>
-              <a:t>10/27/2008</a:t>
+              <a:pPr/>
+              <a:t>10/28/2008</a:t>
             </a:fld>
             <a:endParaRPr lang="en-US"/>
           </a:p>
@@ -2650,6 +2679,7 @@
           <a:p>
             <a:fld id="{0034AAF4-FE8C-49D5-89B2-BA2E4A9E67A6}" type="slidenum">
               <a:rPr lang="en-US" smtClean="0"/>
+              <a:pPr/>
               <a:t>‹#›</a:t>
             </a:fld>
             <a:endParaRPr lang="en-US"/>
@@ -2878,7 +2908,8 @@
           <a:p>
             <a:fld id="{5B190AD6-4DB3-4C5C-B19D-6B7C31FD5945}" type="datetimeFigureOut">
               <a:rPr lang="en-US" smtClean="0"/>
-              <a:t>10/27/2008</a:t>
+              <a:pPr/>
+              <a:t>10/28/2008</a:t>
             </a:fld>
             <a:endParaRPr lang="en-US"/>
           </a:p>
@@ -2924,6 +2955,7 @@
           <a:p>
             <a:fld id="{0034AAF4-FE8C-49D5-89B2-BA2E4A9E67A6}" type="slidenum">
               <a:rPr lang="en-US" smtClean="0"/>
+              <a:pPr/>
               <a:t>‹#›</a:t>
             </a:fld>
             <a:endParaRPr lang="en-US"/>
@@ -3083,7 +3115,8 @@
           <a:p>
             <a:fld id="{5B190AD6-4DB3-4C5C-B19D-6B7C31FD5945}" type="datetimeFigureOut">
               <a:rPr lang="en-US" smtClean="0"/>
-              <a:t>10/27/2008</a:t>
+              <a:pPr/>
+              <a:t>10/28/2008</a:t>
             </a:fld>
             <a:endParaRPr lang="en-US"/>
           </a:p>
@@ -3148,6 +3181,7 @@
           <a:p>
             <a:fld id="{0034AAF4-FE8C-49D5-89B2-BA2E4A9E67A6}" type="slidenum">
               <a:rPr lang="en-US" smtClean="0"/>
+              <a:pPr/>
               <a:t>‹#›</a:t>
             </a:fld>
             <a:endParaRPr lang="en-US"/>
@@ -4192,7 +4226,8 @@
           <a:p>
             <a:fld id="{5B190AD6-4DB3-4C5C-B19D-6B7C31FD5945}" type="datetimeFigureOut">
               <a:rPr lang="en-US" smtClean="0"/>
-              <a:t>10/27/2008</a:t>
+              <a:pPr/>
+              <a:t>10/28/2008</a:t>
             </a:fld>
             <a:endParaRPr lang="en-US"/>
           </a:p>
@@ -4268,6 +4303,7 @@
           <a:p>
             <a:fld id="{0034AAF4-FE8C-49D5-89B2-BA2E4A9E67A6}" type="slidenum">
               <a:rPr lang="en-US" smtClean="0"/>
+              <a:pPr/>
               <a:t>‹#›</a:t>
             </a:fld>
             <a:endParaRPr lang="en-US"/>
@@ -4679,50 +4715,7 @@
       </p:grpSpPr>
       <p:sp>
         <p:nvSpPr>
-          <p:cNvPr id="2" name="Content Placeholder 1"/>
-          <p:cNvSpPr>
-            <a:spLocks noGrp="1"/>
-          </p:cNvSpPr>
-          <p:nvPr>
-            <p:ph idx="1"/>
-          </p:nvPr>
-        </p:nvSpPr>
-        <p:spPr/>
-        <p:txBody>
-          <a:bodyPr/>
-          <a:lstStyle/>
-          <a:p>
-            <a:r>
-              <a:rPr lang="en-US" dirty="0" smtClean="0"/>
-              <a:t>State Management</a:t>
-            </a:r>
-          </a:p>
-          <a:p>
-            <a:r>
-              <a:rPr lang="en-US" dirty="0" smtClean="0"/>
-              <a:t>Progressive Interfaces</a:t>
-            </a:r>
-          </a:p>
-          <a:p>
-            <a:r>
-              <a:rPr lang="en-US" dirty="0" smtClean="0"/>
-              <a:t>The “</a:t>
-            </a:r>
-            <a:r>
-              <a:rPr lang="en-US" dirty="0" err="1" smtClean="0"/>
-              <a:t>Rathole</a:t>
-            </a:r>
-            <a:r>
-              <a:rPr lang="en-US" smtClean="0"/>
-              <a:t>” Problem</a:t>
-            </a:r>
-            <a:endParaRPr lang="en-US" dirty="0" smtClean="0"/>
-          </a:p>
-        </p:txBody>
-      </p:sp>
-      <p:sp>
-        <p:nvSpPr>
-          <p:cNvPr id="3" name="Title 2"/>
+          <p:cNvPr id="4" name="Title 3"/>
           <p:cNvSpPr>
             <a:spLocks noGrp="1"/>
           </p:cNvSpPr>
@@ -4730,16 +4723,1184 @@
             <p:ph type="title"/>
           </p:nvPr>
         </p:nvSpPr>
-        <p:spPr/>
+        <p:spPr>
+          <a:xfrm>
+            <a:off x="2514600" y="2857500"/>
+            <a:ext cx="4114800" cy="1143000"/>
+          </a:xfrm>
+        </p:spPr>
         <p:txBody>
           <a:bodyPr>
             <a:normAutofit fontScale="90000"/>
           </a:bodyPr>
           <a:lstStyle/>
           <a:p>
-            <a:r>
-              <a:rPr lang="en-US" dirty="0" smtClean="0"/>
-              <a:t>Internal DSL: Expression Builder</a:t>
+            <a:pPr algn="ctr"/>
+            <a:r>
+              <a:rPr lang="en-US" sz="7300" dirty="0" smtClean="0"/>
+              <a:t>Break</a:t>
+            </a:r>
+            <a:endParaRPr lang="en-US" dirty="0"/>
+          </a:p>
+        </p:txBody>
+      </p:sp>
+    </p:spTree>
+  </p:cSld>
+  <p:clrMapOvr>
+    <a:masterClrMapping/>
+  </p:clrMapOvr>
+</p:sld>
+</file>
+
+<file path=ppt/slides/slide11.xml><?xml version="1.0" encoding="utf-8"?>
+<p:sld xmlns:a="http://schemas.openxmlformats.org/drawingml/2006/main" xmlns:r="http://schemas.openxmlformats.org/officeDocument/2006/relationships" xmlns:p="http://schemas.openxmlformats.org/presentationml/2006/main">
+  <p:cSld>
+    <p:spTree>
+      <p:nvGrpSpPr>
+        <p:cNvPr id="1" name=""/>
+        <p:cNvGrpSpPr/>
+        <p:nvPr/>
+      </p:nvGrpSpPr>
+      <p:grpSpPr>
+        <a:xfrm>
+          <a:off x="0" y="0"/>
+          <a:ext cx="0" cy="0"/>
+          <a:chOff x="0" y="0"/>
+          <a:chExt cx="0" cy="0"/>
+        </a:xfrm>
+      </p:grpSpPr>
+      <p:sp>
+        <p:nvSpPr>
+          <p:cNvPr id="6" name="Content Placeholder 5"/>
+          <p:cNvSpPr>
+            <a:spLocks noGrp="1"/>
+          </p:cNvSpPr>
+          <p:nvPr>
+            <p:ph idx="1"/>
+          </p:nvPr>
+        </p:nvSpPr>
+        <p:spPr/>
+        <p:txBody>
+          <a:bodyPr/>
+          <a:lstStyle/>
+          <a:p>
+            <a:r>
+              <a:rPr lang="en-US" dirty="0" smtClean="0"/>
+              <a:t>Start with Host Object</a:t>
+            </a:r>
+          </a:p>
+          <a:p>
+            <a:r>
+              <a:rPr lang="en-US" dirty="0" smtClean="0"/>
+              <a:t>Return Host Object from Each Call</a:t>
+            </a:r>
+          </a:p>
+          <a:p>
+            <a:r>
+              <a:rPr lang="en-US" dirty="0" smtClean="0"/>
+              <a:t>Modifies State or Performs an Action</a:t>
+            </a:r>
+          </a:p>
+          <a:p>
+            <a:r>
+              <a:rPr lang="en-US" dirty="0" smtClean="0"/>
+              <a:t>Purpose:</a:t>
+            </a:r>
+          </a:p>
+          <a:p>
+            <a:pPr lvl="1"/>
+            <a:r>
+              <a:rPr lang="en-US" dirty="0" smtClean="0"/>
+              <a:t>Assembly/Population of an Object or Objects</a:t>
+            </a:r>
+          </a:p>
+          <a:p>
+            <a:pPr lvl="1"/>
+            <a:r>
+              <a:rPr lang="en-US" dirty="0" smtClean="0"/>
+              <a:t>Allows for in-line or multi-line statements</a:t>
+            </a:r>
+          </a:p>
+          <a:p>
+            <a:pPr lvl="1"/>
+            <a:r>
+              <a:rPr lang="en-US" dirty="0" smtClean="0"/>
+              <a:t>Provides clear path for consumers</a:t>
+            </a:r>
+          </a:p>
+          <a:p>
+            <a:r>
+              <a:rPr lang="en-US" dirty="0" smtClean="0"/>
+              <a:t>Examples:</a:t>
+            </a:r>
+          </a:p>
+          <a:p>
+            <a:pPr lvl="1"/>
+            <a:r>
+              <a:rPr lang="en-US" dirty="0" err="1" smtClean="0"/>
+              <a:t>System.DateTime</a:t>
+            </a:r>
+            <a:endParaRPr lang="en-US" dirty="0" smtClean="0"/>
+          </a:p>
+          <a:p>
+            <a:pPr lvl="1"/>
+            <a:r>
+              <a:rPr lang="en-US" dirty="0" err="1" smtClean="0"/>
+              <a:t>System.</a:t>
+            </a:r>
+            <a:r>
+              <a:rPr lang="en-US" dirty="0" err="1" smtClean="0"/>
+              <a:t>String</a:t>
+            </a:r>
+            <a:endParaRPr lang="en-US" dirty="0"/>
+          </a:p>
+        </p:txBody>
+      </p:sp>
+      <p:sp>
+        <p:nvSpPr>
+          <p:cNvPr id="5" name="Title 4"/>
+          <p:cNvSpPr>
+            <a:spLocks noGrp="1"/>
+          </p:cNvSpPr>
+          <p:nvPr>
+            <p:ph type="title"/>
+          </p:nvPr>
+        </p:nvSpPr>
+        <p:spPr/>
+        <p:txBody>
+          <a:bodyPr/>
+          <a:lstStyle/>
+          <a:p>
+            <a:r>
+              <a:rPr lang="en-US" dirty="0" smtClean="0"/>
+              <a:t>Method Chaining Pattern	</a:t>
+            </a:r>
+            <a:endParaRPr lang="en-US" dirty="0"/>
+          </a:p>
+        </p:txBody>
+      </p:sp>
+    </p:spTree>
+  </p:cSld>
+  <p:clrMapOvr>
+    <a:masterClrMapping/>
+  </p:clrMapOvr>
+</p:sld>
+</file>
+
+<file path=ppt/slides/slide12.xml><?xml version="1.0" encoding="utf-8"?>
+<p:sld xmlns:a="http://schemas.openxmlformats.org/drawingml/2006/main" xmlns:r="http://schemas.openxmlformats.org/officeDocument/2006/relationships" xmlns:p="http://schemas.openxmlformats.org/presentationml/2006/main">
+  <p:cSld>
+    <p:spTree>
+      <p:nvGrpSpPr>
+        <p:cNvPr id="1" name=""/>
+        <p:cNvGrpSpPr/>
+        <p:nvPr/>
+      </p:nvGrpSpPr>
+      <p:grpSpPr>
+        <a:xfrm>
+          <a:off x="0" y="0"/>
+          <a:ext cx="0" cy="0"/>
+          <a:chOff x="0" y="0"/>
+          <a:chExt cx="0" cy="0"/>
+        </a:xfrm>
+      </p:grpSpPr>
+      <p:sp>
+        <p:nvSpPr>
+          <p:cNvPr id="2" name="Content Placeholder 1"/>
+          <p:cNvSpPr>
+            <a:spLocks noGrp="1"/>
+          </p:cNvSpPr>
+          <p:nvPr>
+            <p:ph idx="1"/>
+          </p:nvPr>
+        </p:nvSpPr>
+        <p:spPr/>
+        <p:txBody>
+          <a:bodyPr/>
+          <a:lstStyle/>
+          <a:p>
+            <a:r>
+              <a:rPr lang="en-US" dirty="0" smtClean="0"/>
+              <a:t>Small, Focused, Deterministic</a:t>
+            </a:r>
+          </a:p>
+          <a:p>
+            <a:r>
+              <a:rPr lang="en-US" dirty="0" smtClean="0"/>
+              <a:t>Encapsulates Frequent </a:t>
+            </a:r>
+            <a:r>
+              <a:rPr lang="en-US" dirty="0" smtClean="0"/>
+              <a:t>Tasks</a:t>
+            </a:r>
+          </a:p>
+          <a:p>
+            <a:r>
+              <a:rPr lang="en-US" dirty="0" smtClean="0"/>
+              <a:t>Helps Keep Flow</a:t>
+            </a:r>
+          </a:p>
+          <a:p>
+            <a:r>
+              <a:rPr lang="en-US" dirty="0" smtClean="0"/>
+              <a:t>Helps Enhance Language</a:t>
+            </a:r>
+          </a:p>
+          <a:p>
+            <a:r>
+              <a:rPr lang="en-US" dirty="0" smtClean="0"/>
+              <a:t>Examples:</a:t>
+            </a:r>
+          </a:p>
+          <a:p>
+            <a:pPr lvl="1"/>
+            <a:r>
+              <a:rPr lang="en-US" dirty="0" err="1" smtClean="0"/>
+              <a:t>DateTime.Parse</a:t>
+            </a:r>
+            <a:r>
+              <a:rPr lang="en-US" dirty="0" smtClean="0"/>
+              <a:t>(), *.Parse()</a:t>
+            </a:r>
+          </a:p>
+          <a:p>
+            <a:pPr lvl="1"/>
+            <a:r>
+              <a:rPr lang="en-US" dirty="0" err="1" smtClean="0"/>
+              <a:t>TimeSpan.FromMinutes</a:t>
+            </a:r>
+            <a:endParaRPr lang="en-US" dirty="0" smtClean="0"/>
+          </a:p>
+          <a:p>
+            <a:pPr lvl="1"/>
+            <a:endParaRPr lang="en-US" dirty="0" smtClean="0"/>
+          </a:p>
+        </p:txBody>
+      </p:sp>
+      <p:sp>
+        <p:nvSpPr>
+          <p:cNvPr id="3" name="Title 2"/>
+          <p:cNvSpPr>
+            <a:spLocks noGrp="1"/>
+          </p:cNvSpPr>
+          <p:nvPr>
+            <p:ph type="title"/>
+          </p:nvPr>
+        </p:nvSpPr>
+        <p:spPr/>
+        <p:txBody>
+          <a:bodyPr/>
+          <a:lstStyle/>
+          <a:p>
+            <a:r>
+              <a:rPr lang="en-US" dirty="0" smtClean="0"/>
+              <a:t>Nested Function Pattern</a:t>
+            </a:r>
+            <a:endParaRPr lang="en-US" dirty="0"/>
+          </a:p>
+        </p:txBody>
+      </p:sp>
+    </p:spTree>
+  </p:cSld>
+  <p:clrMapOvr>
+    <a:masterClrMapping/>
+  </p:clrMapOvr>
+</p:sld>
+</file>
+
+<file path=ppt/slides/slide13.xml><?xml version="1.0" encoding="utf-8"?>
+<p:sld xmlns:a="http://schemas.openxmlformats.org/drawingml/2006/main" xmlns:r="http://schemas.openxmlformats.org/officeDocument/2006/relationships" xmlns:p="http://schemas.openxmlformats.org/presentationml/2006/main">
+  <p:cSld>
+    <p:spTree>
+      <p:nvGrpSpPr>
+        <p:cNvPr id="1" name=""/>
+        <p:cNvGrpSpPr/>
+        <p:nvPr/>
+      </p:nvGrpSpPr>
+      <p:grpSpPr>
+        <a:xfrm>
+          <a:off x="0" y="0"/>
+          <a:ext cx="0" cy="0"/>
+          <a:chOff x="0" y="0"/>
+          <a:chExt cx="0" cy="0"/>
+        </a:xfrm>
+      </p:grpSpPr>
+      <p:sp>
+        <p:nvSpPr>
+          <p:cNvPr id="2" name="Content Placeholder 1"/>
+          <p:cNvSpPr>
+            <a:spLocks noGrp="1"/>
+          </p:cNvSpPr>
+          <p:nvPr>
+            <p:ph idx="1"/>
+          </p:nvPr>
+        </p:nvSpPr>
+        <p:spPr/>
+        <p:txBody>
+          <a:bodyPr/>
+          <a:lstStyle/>
+          <a:p>
+            <a:r>
+              <a:rPr lang="en-US" dirty="0" smtClean="0"/>
+              <a:t>Delegation</a:t>
+            </a:r>
+          </a:p>
+          <a:p>
+            <a:r>
+              <a:rPr lang="en-US" dirty="0" smtClean="0"/>
+              <a:t>Scoping</a:t>
+            </a:r>
+          </a:p>
+          <a:p>
+            <a:r>
+              <a:rPr lang="en-US" dirty="0" smtClean="0"/>
+              <a:t>Physical Separation of Tasks</a:t>
+            </a:r>
+          </a:p>
+          <a:p>
+            <a:r>
+              <a:rPr lang="en-US" dirty="0" smtClean="0"/>
+              <a:t>Deterministic Resolution of Task</a:t>
+            </a:r>
+          </a:p>
+          <a:p>
+            <a:r>
+              <a:rPr lang="en-US" dirty="0" smtClean="0"/>
+              <a:t>Solves “</a:t>
+            </a:r>
+            <a:r>
+              <a:rPr lang="en-US" dirty="0" err="1" smtClean="0"/>
+              <a:t>Rathole</a:t>
+            </a:r>
+            <a:r>
+              <a:rPr lang="en-US" dirty="0" smtClean="0"/>
+              <a:t>” Problem</a:t>
+            </a:r>
+          </a:p>
+          <a:p>
+            <a:r>
+              <a:rPr lang="en-US" dirty="0" smtClean="0"/>
+              <a:t>Examples: </a:t>
+            </a:r>
+          </a:p>
+          <a:p>
+            <a:pPr lvl="1"/>
+            <a:r>
+              <a:rPr lang="en-US" dirty="0" err="1" smtClean="0"/>
+              <a:t>Registry.Scan</a:t>
+            </a:r>
+            <a:r>
+              <a:rPr lang="en-US" dirty="0" smtClean="0"/>
+              <a:t> (</a:t>
+            </a:r>
+            <a:r>
+              <a:rPr lang="en-US" dirty="0" err="1" smtClean="0"/>
+              <a:t>StructureMap</a:t>
+            </a:r>
+            <a:r>
+              <a:rPr lang="en-US" dirty="0" smtClean="0"/>
+              <a:t>)</a:t>
+            </a:r>
+          </a:p>
+          <a:p>
+            <a:pPr lvl="1"/>
+            <a:r>
+              <a:rPr lang="en-US" dirty="0" err="1" smtClean="0"/>
+              <a:t>PersistenceModel.ForEach</a:t>
+            </a:r>
+            <a:r>
+              <a:rPr lang="en-US" dirty="0" smtClean="0"/>
+              <a:t> </a:t>
+            </a:r>
+            <a:r>
+              <a:rPr lang="en-US" dirty="0" smtClean="0"/>
+              <a:t>(Fluent </a:t>
+            </a:r>
+            <a:r>
+              <a:rPr lang="en-US" dirty="0" err="1" smtClean="0"/>
+              <a:t>Nhibernate</a:t>
+            </a:r>
+            <a:r>
+              <a:rPr lang="en-US" dirty="0" smtClean="0"/>
+              <a:t>)</a:t>
+            </a:r>
+            <a:endParaRPr lang="en-US" dirty="0"/>
+          </a:p>
+        </p:txBody>
+      </p:sp>
+      <p:sp>
+        <p:nvSpPr>
+          <p:cNvPr id="3" name="Title 2"/>
+          <p:cNvSpPr>
+            <a:spLocks noGrp="1"/>
+          </p:cNvSpPr>
+          <p:nvPr>
+            <p:ph type="title"/>
+          </p:nvPr>
+        </p:nvSpPr>
+        <p:spPr/>
+        <p:txBody>
+          <a:bodyPr/>
+          <a:lstStyle/>
+          <a:p>
+            <a:r>
+              <a:rPr lang="en-US" dirty="0" smtClean="0"/>
+              <a:t>Nested Closure Pattern</a:t>
+            </a:r>
+            <a:endParaRPr lang="en-US" dirty="0"/>
+          </a:p>
+        </p:txBody>
+      </p:sp>
+    </p:spTree>
+  </p:cSld>
+  <p:clrMapOvr>
+    <a:masterClrMapping/>
+  </p:clrMapOvr>
+</p:sld>
+</file>
+
+<file path=ppt/slides/slide14.xml><?xml version="1.0" encoding="utf-8"?>
+<p:sld xmlns:a="http://schemas.openxmlformats.org/drawingml/2006/main" xmlns:r="http://schemas.openxmlformats.org/officeDocument/2006/relationships" xmlns:p="http://schemas.openxmlformats.org/presentationml/2006/main">
+  <p:cSld>
+    <p:spTree>
+      <p:nvGrpSpPr>
+        <p:cNvPr id="1" name=""/>
+        <p:cNvGrpSpPr/>
+        <p:nvPr/>
+      </p:nvGrpSpPr>
+      <p:grpSpPr>
+        <a:xfrm>
+          <a:off x="0" y="0"/>
+          <a:ext cx="0" cy="0"/>
+          <a:chOff x="0" y="0"/>
+          <a:chExt cx="0" cy="0"/>
+        </a:xfrm>
+      </p:grpSpPr>
+      <p:sp>
+        <p:nvSpPr>
+          <p:cNvPr id="2" name="Content Placeholder 1"/>
+          <p:cNvSpPr>
+            <a:spLocks noGrp="1"/>
+          </p:cNvSpPr>
+          <p:nvPr>
+            <p:ph idx="1"/>
+          </p:nvPr>
+        </p:nvSpPr>
+        <p:spPr/>
+        <p:txBody>
+          <a:bodyPr/>
+          <a:lstStyle/>
+          <a:p>
+            <a:r>
+              <a:rPr lang="en-US" dirty="0" smtClean="0"/>
+              <a:t>Type/Collection/Dictionary Initializers</a:t>
+            </a:r>
+          </a:p>
+          <a:p>
+            <a:r>
+              <a:rPr lang="en-US" dirty="0" smtClean="0"/>
+              <a:t>Can Replace Method Chaining in Many Circumstances</a:t>
+            </a:r>
+          </a:p>
+          <a:p>
+            <a:r>
+              <a:rPr lang="en-US" dirty="0" smtClean="0"/>
+              <a:t>Can be More Expressive, in Less Spaces</a:t>
+            </a:r>
+          </a:p>
+          <a:p>
+            <a:r>
+              <a:rPr lang="en-US" dirty="0" smtClean="0"/>
+              <a:t>Examples:</a:t>
+            </a:r>
+          </a:p>
+          <a:p>
+            <a:pPr lvl="1"/>
+            <a:r>
+              <a:rPr lang="en-US" dirty="0" err="1" smtClean="0"/>
+              <a:t>MsSqlConifgurationTester</a:t>
+            </a:r>
+            <a:r>
+              <a:rPr lang="en-US" dirty="0" smtClean="0"/>
+              <a:t> (Fluent </a:t>
+            </a:r>
+            <a:r>
+              <a:rPr lang="en-US" dirty="0" err="1" smtClean="0"/>
+              <a:t>Nhibernate</a:t>
+            </a:r>
+            <a:r>
+              <a:rPr lang="en-US" dirty="0" smtClean="0"/>
+              <a:t>)</a:t>
+            </a:r>
+            <a:endParaRPr lang="en-US" dirty="0"/>
+          </a:p>
+        </p:txBody>
+      </p:sp>
+      <p:sp>
+        <p:nvSpPr>
+          <p:cNvPr id="3" name="Title 2"/>
+          <p:cNvSpPr>
+            <a:spLocks noGrp="1"/>
+          </p:cNvSpPr>
+          <p:nvPr>
+            <p:ph type="title"/>
+          </p:nvPr>
+        </p:nvSpPr>
+        <p:spPr/>
+        <p:txBody>
+          <a:bodyPr>
+            <a:normAutofit fontScale="90000"/>
+          </a:bodyPr>
+          <a:lstStyle/>
+          <a:p>
+            <a:r>
+              <a:rPr lang="en-US" dirty="0" smtClean="0"/>
+              <a:t>Literal Type Expression Pattern	</a:t>
+            </a:r>
+            <a:endParaRPr lang="en-US" dirty="0"/>
+          </a:p>
+        </p:txBody>
+      </p:sp>
+    </p:spTree>
+  </p:cSld>
+  <p:clrMapOvr>
+    <a:masterClrMapping/>
+  </p:clrMapOvr>
+</p:sld>
+</file>
+
+<file path=ppt/slides/slide15.xml><?xml version="1.0" encoding="utf-8"?>
+<p:sld xmlns:a="http://schemas.openxmlformats.org/drawingml/2006/main" xmlns:r="http://schemas.openxmlformats.org/officeDocument/2006/relationships" xmlns:p="http://schemas.openxmlformats.org/presentationml/2006/main">
+  <p:cSld>
+    <p:spTree>
+      <p:nvGrpSpPr>
+        <p:cNvPr id="1" name=""/>
+        <p:cNvGrpSpPr/>
+        <p:nvPr/>
+      </p:nvGrpSpPr>
+      <p:grpSpPr>
+        <a:xfrm>
+          <a:off x="0" y="0"/>
+          <a:ext cx="0" cy="0"/>
+          <a:chOff x="0" y="0"/>
+          <a:chExt cx="0" cy="0"/>
+        </a:xfrm>
+      </p:grpSpPr>
+      <p:sp>
+        <p:nvSpPr>
+          <p:cNvPr id="2" name="Content Placeholder 1"/>
+          <p:cNvSpPr>
+            <a:spLocks noGrp="1"/>
+          </p:cNvSpPr>
+          <p:nvPr>
+            <p:ph idx="1"/>
+          </p:nvPr>
+        </p:nvSpPr>
+        <p:spPr/>
+        <p:txBody>
+          <a:bodyPr/>
+          <a:lstStyle/>
+          <a:p>
+            <a:r>
+              <a:rPr lang="en-US" dirty="0" smtClean="0"/>
+              <a:t>In C# 3.0, this means Extension Methods</a:t>
+            </a:r>
+          </a:p>
+          <a:p>
+            <a:r>
+              <a:rPr lang="en-US" dirty="0" smtClean="0"/>
+              <a:t>In C# 4.0, much, much more</a:t>
+            </a:r>
+          </a:p>
+          <a:p>
+            <a:r>
+              <a:rPr lang="en-US" dirty="0" smtClean="0"/>
+              <a:t>Attaching Different Behavior to Existing API</a:t>
+            </a:r>
+          </a:p>
+          <a:p>
+            <a:r>
+              <a:rPr lang="en-US" dirty="0" smtClean="0"/>
+              <a:t>Extensibility Point for Existing DSLs</a:t>
+            </a:r>
+          </a:p>
+          <a:p>
+            <a:r>
+              <a:rPr lang="en-US" dirty="0" smtClean="0"/>
+              <a:t>Allows for Different Grammars for Same API</a:t>
+            </a:r>
+          </a:p>
+          <a:p>
+            <a:r>
+              <a:rPr lang="en-US" dirty="0" smtClean="0"/>
+              <a:t>Examples:</a:t>
+            </a:r>
+          </a:p>
+          <a:p>
+            <a:pPr lvl="1"/>
+            <a:r>
+              <a:rPr lang="en-US" dirty="0" err="1" smtClean="0"/>
+              <a:t>XmlExtensions</a:t>
+            </a:r>
+            <a:r>
+              <a:rPr lang="en-US" dirty="0" smtClean="0"/>
+              <a:t> (Fluent </a:t>
+            </a:r>
+            <a:r>
+              <a:rPr lang="en-US" dirty="0" err="1" smtClean="0"/>
+              <a:t>Nhibernate</a:t>
+            </a:r>
+            <a:r>
+              <a:rPr lang="en-US" dirty="0" smtClean="0"/>
+              <a:t>)</a:t>
+            </a:r>
+          </a:p>
+          <a:p>
+            <a:pPr lvl="1"/>
+            <a:r>
+              <a:rPr lang="en-US" dirty="0" smtClean="0"/>
+              <a:t>Specification Extensions (Fluent </a:t>
+            </a:r>
+            <a:r>
+              <a:rPr lang="en-US" dirty="0" err="1" smtClean="0"/>
+              <a:t>Nhibernate</a:t>
+            </a:r>
+            <a:r>
+              <a:rPr lang="en-US" dirty="0" smtClean="0"/>
+              <a:t>)</a:t>
+            </a:r>
+          </a:p>
+        </p:txBody>
+      </p:sp>
+      <p:sp>
+        <p:nvSpPr>
+          <p:cNvPr id="3" name="Title 2"/>
+          <p:cNvSpPr>
+            <a:spLocks noGrp="1"/>
+          </p:cNvSpPr>
+          <p:nvPr>
+            <p:ph type="title"/>
+          </p:nvPr>
+        </p:nvSpPr>
+        <p:spPr/>
+        <p:txBody>
+          <a:bodyPr/>
+          <a:lstStyle/>
+          <a:p>
+            <a:r>
+              <a:rPr lang="en-US" dirty="0" smtClean="0"/>
+              <a:t>Dynamic Reception Pattern</a:t>
+            </a:r>
+            <a:endParaRPr lang="en-US" dirty="0"/>
+          </a:p>
+        </p:txBody>
+      </p:sp>
+    </p:spTree>
+  </p:cSld>
+  <p:clrMapOvr>
+    <a:masterClrMapping/>
+  </p:clrMapOvr>
+</p:sld>
+</file>
+
+<file path=ppt/slides/slide16.xml><?xml version="1.0" encoding="utf-8"?>
+<p:sld xmlns:a="http://schemas.openxmlformats.org/drawingml/2006/main" xmlns:r="http://schemas.openxmlformats.org/officeDocument/2006/relationships" xmlns:p="http://schemas.openxmlformats.org/presentationml/2006/main">
+  <p:cSld>
+    <p:spTree>
+      <p:nvGrpSpPr>
+        <p:cNvPr id="1" name=""/>
+        <p:cNvGrpSpPr/>
+        <p:nvPr/>
+      </p:nvGrpSpPr>
+      <p:grpSpPr>
+        <a:xfrm>
+          <a:off x="0" y="0"/>
+          <a:ext cx="0" cy="0"/>
+          <a:chOff x="0" y="0"/>
+          <a:chExt cx="0" cy="0"/>
+        </a:xfrm>
+      </p:grpSpPr>
+      <p:sp>
+        <p:nvSpPr>
+          <p:cNvPr id="2" name="Content Placeholder 1"/>
+          <p:cNvSpPr>
+            <a:spLocks noGrp="1"/>
+          </p:cNvSpPr>
+          <p:nvPr>
+            <p:ph idx="1"/>
+          </p:nvPr>
+        </p:nvSpPr>
+        <p:spPr/>
+        <p:txBody>
+          <a:bodyPr/>
+          <a:lstStyle/>
+          <a:p>
+            <a:r>
+              <a:rPr lang="en-US" dirty="0" smtClean="0"/>
+              <a:t>In C#, this means Expression Trees</a:t>
+            </a:r>
+          </a:p>
+          <a:p>
+            <a:r>
+              <a:rPr lang="en-US" dirty="0" smtClean="0"/>
+              <a:t>Useful for Static Reflection</a:t>
+            </a:r>
+          </a:p>
+          <a:p>
+            <a:r>
+              <a:rPr lang="en-US" dirty="0" smtClean="0"/>
+              <a:t>Can Compose Expressions</a:t>
+            </a:r>
+          </a:p>
+          <a:p>
+            <a:r>
+              <a:rPr lang="en-US" dirty="0" smtClean="0"/>
+              <a:t>Examples:</a:t>
+            </a:r>
+          </a:p>
+          <a:p>
+            <a:pPr lvl="1"/>
+            <a:r>
+              <a:rPr lang="en-US" dirty="0" err="1" smtClean="0"/>
+              <a:t>ClassMap</a:t>
+            </a:r>
+            <a:r>
+              <a:rPr lang="en-US" dirty="0" smtClean="0"/>
+              <a:t>&lt;T&gt; (Fluent </a:t>
+            </a:r>
+            <a:r>
+              <a:rPr lang="en-US" dirty="0" err="1" smtClean="0"/>
+              <a:t>Nhibernate</a:t>
+            </a:r>
+            <a:r>
+              <a:rPr lang="en-US" dirty="0" smtClean="0"/>
+              <a:t>)</a:t>
+            </a:r>
+          </a:p>
+          <a:p>
+            <a:pPr lvl="1"/>
+            <a:r>
+              <a:rPr lang="en-US" dirty="0" err="1" smtClean="0"/>
+              <a:t>EntityQuery</a:t>
+            </a:r>
+            <a:r>
+              <a:rPr lang="en-US" dirty="0" smtClean="0"/>
+              <a:t> stuff (Fluent </a:t>
+            </a:r>
+            <a:r>
+              <a:rPr lang="en-US" dirty="0" err="1" smtClean="0"/>
+              <a:t>Nhibernate</a:t>
+            </a:r>
+            <a:r>
+              <a:rPr lang="en-US" dirty="0" smtClean="0"/>
+              <a:t>)</a:t>
+            </a:r>
+          </a:p>
+        </p:txBody>
+      </p:sp>
+      <p:sp>
+        <p:nvSpPr>
+          <p:cNvPr id="3" name="Title 2"/>
+          <p:cNvSpPr>
+            <a:spLocks noGrp="1"/>
+          </p:cNvSpPr>
+          <p:nvPr>
+            <p:ph type="title"/>
+          </p:nvPr>
+        </p:nvSpPr>
+        <p:spPr/>
+        <p:txBody>
+          <a:bodyPr>
+            <a:normAutofit fontScale="90000"/>
+          </a:bodyPr>
+          <a:lstStyle/>
+          <a:p>
+            <a:r>
+              <a:rPr lang="en-US" dirty="0" smtClean="0"/>
+              <a:t>Parse Tree Manipulation Pattern	</a:t>
+            </a:r>
+            <a:endParaRPr lang="en-US" dirty="0"/>
+          </a:p>
+        </p:txBody>
+      </p:sp>
+    </p:spTree>
+  </p:cSld>
+  <p:clrMapOvr>
+    <a:masterClrMapping/>
+  </p:clrMapOvr>
+</p:sld>
+</file>
+
+<file path=ppt/slides/slide17.xml><?xml version="1.0" encoding="utf-8"?>
+<p:sld xmlns:a="http://schemas.openxmlformats.org/drawingml/2006/main" xmlns:r="http://schemas.openxmlformats.org/officeDocument/2006/relationships" xmlns:p="http://schemas.openxmlformats.org/presentationml/2006/main">
+  <p:cSld>
+    <p:spTree>
+      <p:nvGrpSpPr>
+        <p:cNvPr id="1" name=""/>
+        <p:cNvGrpSpPr/>
+        <p:nvPr/>
+      </p:nvGrpSpPr>
+      <p:grpSpPr>
+        <a:xfrm>
+          <a:off x="0" y="0"/>
+          <a:ext cx="0" cy="0"/>
+          <a:chOff x="0" y="0"/>
+          <a:chExt cx="0" cy="0"/>
+        </a:xfrm>
+      </p:grpSpPr>
+      <p:sp>
+        <p:nvSpPr>
+          <p:cNvPr id="2" name="Content Placeholder 1"/>
+          <p:cNvSpPr>
+            <a:spLocks noGrp="1"/>
+          </p:cNvSpPr>
+          <p:nvPr>
+            <p:ph idx="1"/>
+          </p:nvPr>
+        </p:nvSpPr>
+        <p:spPr/>
+        <p:txBody>
+          <a:bodyPr/>
+          <a:lstStyle/>
+          <a:p>
+            <a:r>
+              <a:rPr lang="en-US" dirty="0" smtClean="0"/>
+              <a:t>State Management</a:t>
+            </a:r>
+          </a:p>
+          <a:p>
+            <a:r>
+              <a:rPr lang="en-US" dirty="0" smtClean="0"/>
+              <a:t>Progressive Interfaces</a:t>
+            </a:r>
+          </a:p>
+          <a:p>
+            <a:r>
+              <a:rPr lang="en-US" dirty="0" smtClean="0"/>
+              <a:t>The “</a:t>
+            </a:r>
+            <a:r>
+              <a:rPr lang="en-US" dirty="0" err="1" smtClean="0"/>
+              <a:t>Rathole</a:t>
+            </a:r>
+            <a:r>
+              <a:rPr lang="en-US" dirty="0" smtClean="0"/>
+              <a:t>” </a:t>
+            </a:r>
+            <a:r>
+              <a:rPr lang="en-US" dirty="0" smtClean="0"/>
+              <a:t>Problem</a:t>
+            </a:r>
+          </a:p>
+          <a:p>
+            <a:r>
+              <a:rPr lang="en-US" dirty="0" smtClean="0"/>
+              <a:t>Examples: </a:t>
+            </a:r>
+          </a:p>
+          <a:p>
+            <a:pPr lvl="1"/>
+            <a:r>
+              <a:rPr lang="en-US" dirty="0" err="1" smtClean="0"/>
+              <a:t>CascadeExpression</a:t>
+            </a:r>
+            <a:r>
+              <a:rPr lang="en-US" dirty="0" smtClean="0"/>
+              <a:t> (Fluent </a:t>
+            </a:r>
+            <a:r>
+              <a:rPr lang="en-US" dirty="0" err="1" smtClean="0"/>
+              <a:t>Nhibernate</a:t>
+            </a:r>
+            <a:r>
+              <a:rPr lang="en-US" dirty="0" smtClean="0"/>
+              <a:t>)</a:t>
+            </a:r>
+          </a:p>
+          <a:p>
+            <a:pPr lvl="1"/>
+            <a:r>
+              <a:rPr lang="en-US" dirty="0" err="1" smtClean="0"/>
+              <a:t>ManyToManyPart</a:t>
+            </a:r>
+            <a:r>
+              <a:rPr lang="en-US" dirty="0" smtClean="0"/>
+              <a:t> (Fluent </a:t>
+            </a:r>
+            <a:r>
+              <a:rPr lang="en-US" dirty="0" err="1" smtClean="0"/>
+              <a:t>Nhibernate</a:t>
+            </a:r>
+            <a:r>
+              <a:rPr lang="en-US" dirty="0" smtClean="0"/>
+              <a:t>)</a:t>
+            </a:r>
+            <a:endParaRPr lang="en-US" dirty="0" smtClean="0"/>
+          </a:p>
+          <a:p>
+            <a:pPr lvl="1"/>
+            <a:r>
+              <a:rPr lang="en-US" dirty="0" err="1" smtClean="0"/>
+              <a:t>ActionLinkExpression</a:t>
+            </a:r>
+            <a:r>
+              <a:rPr lang="en-US" dirty="0" smtClean="0"/>
+              <a:t> (Dovetail)</a:t>
+            </a:r>
+          </a:p>
+          <a:p>
+            <a:pPr lvl="1"/>
+            <a:r>
+              <a:rPr lang="en-US" dirty="0" err="1" smtClean="0"/>
+              <a:t>ExpressionBase</a:t>
+            </a:r>
+            <a:r>
+              <a:rPr lang="en-US" dirty="0" smtClean="0"/>
+              <a:t> (Dovetail)</a:t>
+            </a:r>
+            <a:endParaRPr lang="en-US" dirty="0" smtClean="0"/>
+          </a:p>
+        </p:txBody>
+      </p:sp>
+      <p:sp>
+        <p:nvSpPr>
+          <p:cNvPr id="3" name="Title 2"/>
+          <p:cNvSpPr>
+            <a:spLocks noGrp="1"/>
+          </p:cNvSpPr>
+          <p:nvPr>
+            <p:ph type="title"/>
+          </p:nvPr>
+        </p:nvSpPr>
+        <p:spPr/>
+        <p:txBody>
+          <a:bodyPr>
+            <a:normAutofit/>
+          </a:bodyPr>
+          <a:lstStyle/>
+          <a:p>
+            <a:r>
+              <a:rPr lang="en-US" dirty="0" smtClean="0"/>
+              <a:t>Expression Builder Pattern</a:t>
+            </a:r>
+            <a:endParaRPr lang="en-US" dirty="0"/>
+          </a:p>
+        </p:txBody>
+      </p:sp>
+    </p:spTree>
+  </p:cSld>
+  <p:clrMapOvr>
+    <a:masterClrMapping/>
+  </p:clrMapOvr>
+</p:sld>
+</file>
+
+<file path=ppt/slides/slide18.xml><?xml version="1.0" encoding="utf-8"?>
+<p:sld xmlns:a="http://schemas.openxmlformats.org/drawingml/2006/main" xmlns:r="http://schemas.openxmlformats.org/officeDocument/2006/relationships" xmlns:p="http://schemas.openxmlformats.org/presentationml/2006/main">
+  <p:cSld>
+    <p:spTree>
+      <p:nvGrpSpPr>
+        <p:cNvPr id="1" name=""/>
+        <p:cNvGrpSpPr/>
+        <p:nvPr/>
+      </p:nvGrpSpPr>
+      <p:grpSpPr>
+        <a:xfrm>
+          <a:off x="0" y="0"/>
+          <a:ext cx="0" cy="0"/>
+          <a:chOff x="0" y="0"/>
+          <a:chExt cx="0" cy="0"/>
+        </a:xfrm>
+      </p:grpSpPr>
+      <p:sp>
+        <p:nvSpPr>
+          <p:cNvPr id="2" name="Content Placeholder 1"/>
+          <p:cNvSpPr>
+            <a:spLocks noGrp="1"/>
+          </p:cNvSpPr>
+          <p:nvPr>
+            <p:ph idx="1"/>
+          </p:nvPr>
+        </p:nvSpPr>
+        <p:spPr/>
+        <p:txBody>
+          <a:bodyPr/>
+          <a:lstStyle/>
+          <a:p>
+            <a:r>
+              <a:rPr lang="en-US" dirty="0" smtClean="0"/>
+              <a:t>Can be used directly, or serves as base class</a:t>
+            </a:r>
+          </a:p>
+          <a:p>
+            <a:r>
+              <a:rPr lang="en-US" dirty="0" smtClean="0"/>
+              <a:t>Contains starter methods</a:t>
+            </a:r>
+          </a:p>
+          <a:p>
+            <a:r>
+              <a:rPr lang="en-US" dirty="0" smtClean="0"/>
+              <a:t>Launching point for other patterns</a:t>
+            </a:r>
+          </a:p>
+          <a:p>
+            <a:r>
+              <a:rPr lang="en-US" dirty="0" smtClean="0"/>
+              <a:t>Examples:</a:t>
+            </a:r>
+          </a:p>
+          <a:p>
+            <a:pPr lvl="1"/>
+            <a:r>
+              <a:rPr lang="en-US" dirty="0" smtClean="0"/>
+              <a:t>Registry (</a:t>
+            </a:r>
+            <a:r>
+              <a:rPr lang="en-US" dirty="0" err="1" smtClean="0"/>
+              <a:t>StructureMap</a:t>
+            </a:r>
+            <a:r>
+              <a:rPr lang="en-US" dirty="0" smtClean="0"/>
+              <a:t>)</a:t>
+            </a:r>
+          </a:p>
+          <a:p>
+            <a:pPr lvl="1"/>
+            <a:r>
+              <a:rPr lang="en-US" dirty="0" err="1" smtClean="0"/>
+              <a:t>PersistenceModel</a:t>
+            </a:r>
+            <a:r>
+              <a:rPr lang="en-US" dirty="0" smtClean="0"/>
+              <a:t> (Fluent </a:t>
+            </a:r>
+            <a:r>
+              <a:rPr lang="en-US" dirty="0" err="1" smtClean="0"/>
+              <a:t>Nhibernate</a:t>
+            </a:r>
+            <a:r>
+              <a:rPr lang="en-US" dirty="0" smtClean="0"/>
+              <a:t>)</a:t>
+            </a:r>
+            <a:endParaRPr lang="en-US" dirty="0"/>
+          </a:p>
+        </p:txBody>
+      </p:sp>
+      <p:sp>
+        <p:nvSpPr>
+          <p:cNvPr id="3" name="Title 2"/>
+          <p:cNvSpPr>
+            <a:spLocks noGrp="1"/>
+          </p:cNvSpPr>
+          <p:nvPr>
+            <p:ph type="title"/>
+          </p:nvPr>
+        </p:nvSpPr>
+        <p:spPr/>
+        <p:txBody>
+          <a:bodyPr/>
+          <a:lstStyle/>
+          <a:p>
+            <a:r>
+              <a:rPr lang="en-US" dirty="0" smtClean="0"/>
+              <a:t>Object Scoping Pattern</a:t>
+            </a:r>
+            <a:endParaRPr lang="en-US" dirty="0"/>
+          </a:p>
+        </p:txBody>
+      </p:sp>
+    </p:spTree>
+  </p:cSld>
+  <p:clrMapOvr>
+    <a:masterClrMapping/>
+  </p:clrMapOvr>
+</p:sld>
+</file>
+
+<file path=ppt/slides/slide19.xml><?xml version="1.0" encoding="utf-8"?>
+<p:sld xmlns:a="http://schemas.openxmlformats.org/drawingml/2006/main" xmlns:r="http://schemas.openxmlformats.org/officeDocument/2006/relationships" xmlns:p="http://schemas.openxmlformats.org/presentationml/2006/main">
+  <p:cSld>
+    <p:spTree>
+      <p:nvGrpSpPr>
+        <p:cNvPr id="1" name=""/>
+        <p:cNvGrpSpPr/>
+        <p:nvPr/>
+      </p:nvGrpSpPr>
+      <p:grpSpPr>
+        <a:xfrm>
+          <a:off x="0" y="0"/>
+          <a:ext cx="0" cy="0"/>
+          <a:chOff x="0" y="0"/>
+          <a:chExt cx="0" cy="0"/>
+        </a:xfrm>
+      </p:grpSpPr>
+      <p:sp>
+        <p:nvSpPr>
+          <p:cNvPr id="2" name="Content Placeholder 1"/>
+          <p:cNvSpPr>
+            <a:spLocks noGrp="1"/>
+          </p:cNvSpPr>
+          <p:nvPr>
+            <p:ph idx="1"/>
+          </p:nvPr>
+        </p:nvSpPr>
+        <p:spPr/>
+        <p:txBody>
+          <a:bodyPr/>
+          <a:lstStyle/>
+          <a:p>
+            <a:r>
+              <a:rPr lang="en-US" dirty="0" smtClean="0"/>
+              <a:t>Can also be structural</a:t>
+            </a:r>
+          </a:p>
+          <a:p>
+            <a:r>
+              <a:rPr lang="en-US" dirty="0" smtClean="0"/>
+              <a:t>Examples:</a:t>
+            </a:r>
+          </a:p>
+          <a:p>
+            <a:pPr lvl="1"/>
+            <a:r>
+              <a:rPr lang="en-US" dirty="0" err="1" smtClean="0"/>
+              <a:t>ObjectFactory.Initialize</a:t>
+            </a:r>
+            <a:r>
+              <a:rPr lang="en-US" dirty="0" smtClean="0"/>
+              <a:t> (</a:t>
+            </a:r>
+            <a:r>
+              <a:rPr lang="en-US" dirty="0" err="1" smtClean="0"/>
+              <a:t>StructureMap</a:t>
+            </a:r>
+            <a:r>
+              <a:rPr lang="en-US" dirty="0" smtClean="0"/>
+              <a:t>)</a:t>
+            </a:r>
+            <a:endParaRPr lang="en-US" dirty="0"/>
+          </a:p>
+        </p:txBody>
+      </p:sp>
+      <p:sp>
+        <p:nvSpPr>
+          <p:cNvPr id="3" name="Title 2"/>
+          <p:cNvSpPr>
+            <a:spLocks noGrp="1"/>
+          </p:cNvSpPr>
+          <p:nvPr>
+            <p:ph type="title"/>
+          </p:nvPr>
+        </p:nvSpPr>
+        <p:spPr/>
+        <p:txBody>
+          <a:bodyPr/>
+          <a:lstStyle/>
+          <a:p>
+            <a:r>
+              <a:rPr lang="en-US" dirty="0" smtClean="0"/>
+              <a:t>Delegation (Nested Closures)</a:t>
             </a:r>
             <a:endParaRPr lang="en-US" dirty="0"/>
           </a:p>
@@ -4842,6 +6003,252 @@
 </p:sld>
 </file>
 
+<file path=ppt/slides/slide20.xml><?xml version="1.0" encoding="utf-8"?>
+<p:sld xmlns:a="http://schemas.openxmlformats.org/drawingml/2006/main" xmlns:r="http://schemas.openxmlformats.org/officeDocument/2006/relationships" xmlns:p="http://schemas.openxmlformats.org/presentationml/2006/main">
+  <p:cSld>
+    <p:spTree>
+      <p:nvGrpSpPr>
+        <p:cNvPr id="1" name=""/>
+        <p:cNvGrpSpPr/>
+        <p:nvPr/>
+      </p:nvGrpSpPr>
+      <p:grpSpPr>
+        <a:xfrm>
+          <a:off x="0" y="0"/>
+          <a:ext cx="0" cy="0"/>
+          <a:chOff x="0" y="0"/>
+          <a:chExt cx="0" cy="0"/>
+        </a:xfrm>
+      </p:grpSpPr>
+      <p:sp>
+        <p:nvSpPr>
+          <p:cNvPr id="2" name="Content Placeholder 1"/>
+          <p:cNvSpPr>
+            <a:spLocks noGrp="1"/>
+          </p:cNvSpPr>
+          <p:nvPr>
+            <p:ph idx="1"/>
+          </p:nvPr>
+        </p:nvSpPr>
+        <p:spPr/>
+        <p:txBody>
+          <a:bodyPr/>
+          <a:lstStyle/>
+          <a:p>
+            <a:r>
+              <a:rPr lang="en-US" dirty="0" smtClean="0"/>
+              <a:t>Discovery of types</a:t>
+            </a:r>
+          </a:p>
+          <a:p>
+            <a:r>
+              <a:rPr lang="en-US" dirty="0" smtClean="0"/>
+              <a:t>Identification of interesting types</a:t>
+            </a:r>
+          </a:p>
+          <a:p>
+            <a:r>
+              <a:rPr lang="en-US" dirty="0" smtClean="0"/>
+              <a:t>Application</a:t>
+            </a:r>
+          </a:p>
+          <a:p>
+            <a:r>
+              <a:rPr lang="en-US" dirty="0" smtClean="0"/>
+              <a:t>Examples:</a:t>
+            </a:r>
+          </a:p>
+          <a:p>
+            <a:pPr lvl="1"/>
+            <a:r>
+              <a:rPr lang="en-US" dirty="0" err="1" smtClean="0"/>
+              <a:t>ITypeScanner</a:t>
+            </a:r>
+            <a:r>
+              <a:rPr lang="en-US" dirty="0" smtClean="0"/>
+              <a:t> (</a:t>
+            </a:r>
+            <a:r>
+              <a:rPr lang="en-US" dirty="0" err="1" smtClean="0"/>
+              <a:t>StructureMap</a:t>
+            </a:r>
+            <a:r>
+              <a:rPr lang="en-US" dirty="0" smtClean="0"/>
+              <a:t>)</a:t>
+            </a:r>
+          </a:p>
+          <a:p>
+            <a:pPr lvl="1"/>
+            <a:r>
+              <a:rPr lang="en-US" dirty="0" err="1" smtClean="0"/>
+              <a:t>AutoPersistenceModel</a:t>
+            </a:r>
+            <a:r>
+              <a:rPr lang="en-US" dirty="0" smtClean="0"/>
+              <a:t> (Fluent </a:t>
+            </a:r>
+            <a:r>
+              <a:rPr lang="en-US" dirty="0" err="1" smtClean="0"/>
+              <a:t>Nhibernate</a:t>
+            </a:r>
+            <a:r>
+              <a:rPr lang="en-US" dirty="0" smtClean="0"/>
+              <a:t>)</a:t>
+            </a:r>
+            <a:endParaRPr lang="en-US" dirty="0"/>
+          </a:p>
+        </p:txBody>
+      </p:sp>
+      <p:sp>
+        <p:nvSpPr>
+          <p:cNvPr id="3" name="Title 2"/>
+          <p:cNvSpPr>
+            <a:spLocks noGrp="1"/>
+          </p:cNvSpPr>
+          <p:nvPr>
+            <p:ph type="title"/>
+          </p:nvPr>
+        </p:nvSpPr>
+        <p:spPr/>
+        <p:txBody>
+          <a:bodyPr/>
+          <a:lstStyle/>
+          <a:p>
+            <a:r>
+              <a:rPr lang="en-US" dirty="0" smtClean="0"/>
+              <a:t>Conventions</a:t>
+            </a:r>
+            <a:endParaRPr lang="en-US" dirty="0"/>
+          </a:p>
+        </p:txBody>
+      </p:sp>
+    </p:spTree>
+  </p:cSld>
+  <p:clrMapOvr>
+    <a:masterClrMapping/>
+  </p:clrMapOvr>
+</p:sld>
+</file>
+
+<file path=ppt/slides/slide21.xml><?xml version="1.0" encoding="utf-8"?>
+<p:sld xmlns:a="http://schemas.openxmlformats.org/drawingml/2006/main" xmlns:r="http://schemas.openxmlformats.org/officeDocument/2006/relationships" xmlns:p="http://schemas.openxmlformats.org/presentationml/2006/main">
+  <p:cSld>
+    <p:spTree>
+      <p:nvGrpSpPr>
+        <p:cNvPr id="1" name=""/>
+        <p:cNvGrpSpPr/>
+        <p:nvPr/>
+      </p:nvGrpSpPr>
+      <p:grpSpPr>
+        <a:xfrm>
+          <a:off x="0" y="0"/>
+          <a:ext cx="0" cy="0"/>
+          <a:chOff x="0" y="0"/>
+          <a:chExt cx="0" cy="0"/>
+        </a:xfrm>
+      </p:grpSpPr>
+      <p:sp>
+        <p:nvSpPr>
+          <p:cNvPr id="4" name="Title 3"/>
+          <p:cNvSpPr>
+            <a:spLocks noGrp="1"/>
+          </p:cNvSpPr>
+          <p:nvPr>
+            <p:ph type="title"/>
+          </p:nvPr>
+        </p:nvSpPr>
+        <p:spPr>
+          <a:xfrm>
+            <a:off x="2514600" y="2857500"/>
+            <a:ext cx="4114800" cy="1143000"/>
+          </a:xfrm>
+        </p:spPr>
+        <p:txBody>
+          <a:bodyPr>
+            <a:normAutofit fontScale="90000"/>
+          </a:bodyPr>
+          <a:lstStyle/>
+          <a:p>
+            <a:pPr algn="ctr"/>
+            <a:r>
+              <a:rPr lang="en-US" sz="7300" dirty="0" smtClean="0"/>
+              <a:t>Break</a:t>
+            </a:r>
+            <a:endParaRPr lang="en-US" dirty="0"/>
+          </a:p>
+        </p:txBody>
+      </p:sp>
+    </p:spTree>
+  </p:cSld>
+  <p:clrMapOvr>
+    <a:masterClrMapping/>
+  </p:clrMapOvr>
+</p:sld>
+</file>
+
+<file path=ppt/slides/slide22.xml><?xml version="1.0" encoding="utf-8"?>
+<p:sld xmlns:a="http://schemas.openxmlformats.org/drawingml/2006/main" xmlns:r="http://schemas.openxmlformats.org/officeDocument/2006/relationships" xmlns:p="http://schemas.openxmlformats.org/presentationml/2006/main">
+  <p:cSld>
+    <p:spTree>
+      <p:nvGrpSpPr>
+        <p:cNvPr id="1" name=""/>
+        <p:cNvGrpSpPr/>
+        <p:nvPr/>
+      </p:nvGrpSpPr>
+      <p:grpSpPr>
+        <a:xfrm>
+          <a:off x="0" y="0"/>
+          <a:ext cx="0" cy="0"/>
+          <a:chOff x="0" y="0"/>
+          <a:chExt cx="0" cy="0"/>
+        </a:xfrm>
+      </p:grpSpPr>
+      <p:sp>
+        <p:nvSpPr>
+          <p:cNvPr id="2" name="Content Placeholder 1"/>
+          <p:cNvSpPr>
+            <a:spLocks noGrp="1"/>
+          </p:cNvSpPr>
+          <p:nvPr>
+            <p:ph idx="1"/>
+          </p:nvPr>
+        </p:nvSpPr>
+        <p:spPr/>
+        <p:txBody>
+          <a:bodyPr/>
+          <a:lstStyle/>
+          <a:p>
+            <a:endParaRPr lang="en-US"/>
+          </a:p>
+        </p:txBody>
+      </p:sp>
+      <p:sp>
+        <p:nvSpPr>
+          <p:cNvPr id="3" name="Title 2"/>
+          <p:cNvSpPr>
+            <a:spLocks noGrp="1"/>
+          </p:cNvSpPr>
+          <p:nvPr>
+            <p:ph type="title"/>
+          </p:nvPr>
+        </p:nvSpPr>
+        <p:spPr/>
+        <p:txBody>
+          <a:bodyPr/>
+          <a:lstStyle/>
+          <a:p>
+            <a:endParaRPr lang="en-US"/>
+          </a:p>
+        </p:txBody>
+      </p:sp>
+    </p:spTree>
+  </p:cSld>
+  <p:clrMapOvr>
+    <a:masterClrMapping/>
+  </p:clrMapOvr>
+</p:sld>
+</file>
+
 <file path=ppt/slides/slide3.xml><?xml version="1.0" encoding="utf-8"?>
 <p:sld xmlns:a="http://schemas.openxmlformats.org/drawingml/2006/main" xmlns:r="http://schemas.openxmlformats.org/officeDocument/2006/relationships" xmlns:p="http://schemas.openxmlformats.org/presentationml/2006/main">
   <p:cSld>
@@ -5153,15 +6560,7 @@
           <a:p>
             <a:r>
               <a:rPr lang="en-US" dirty="0" smtClean="0"/>
-              <a:t>Unconventional – but still disciplined </a:t>
-            </a:r>
-            <a:r>
-              <a:rPr lang="en-US" dirty="0" smtClean="0"/>
-              <a:t>–</a:t>
-            </a:r>
-            <a:r>
-              <a:rPr lang="en-US" dirty="0" smtClean="0"/>
-              <a:t> use of language techniques (Language Oriented Programming)</a:t>
+              <a:t>Unconventional – but still disciplined – use of language techniques (Language Oriented Programming)</a:t>
             </a:r>
           </a:p>
           <a:p>
@@ -5659,21 +7058,26 @@
             <a:pPr lvl="1"/>
             <a:r>
               <a:rPr lang="en-US" dirty="0" smtClean="0"/>
-              <a:t>Object Scoping</a:t>
+              <a:t>Object </a:t>
+            </a:r>
+            <a:r>
+              <a:rPr lang="en-US" dirty="0" smtClean="0"/>
+              <a:t>Scoping</a:t>
             </a:r>
           </a:p>
           <a:p>
             <a:pPr lvl="1"/>
             <a:r>
               <a:rPr lang="en-US" dirty="0" smtClean="0"/>
-              <a:t>Delegation</a:t>
-            </a:r>
+              <a:t>Delegation (Nested Closures Revisited)</a:t>
+            </a:r>
+            <a:endParaRPr lang="en-US" dirty="0" smtClean="0"/>
           </a:p>
           <a:p>
             <a:pPr lvl="1"/>
             <a:r>
               <a:rPr lang="en-US" dirty="0" smtClean="0"/>
-              <a:t>Conventional Batching</a:t>
+              <a:t>Convention</a:t>
             </a:r>
             <a:endParaRPr lang="en-US" dirty="0"/>
           </a:p>

</xml_diff>

<commit_message>
- Finished PPTX - Added sample DSL
</commit_message>
<xml_diff>
--- a/presentations/chadmyers/InternalDSLs/doc/Internal Domain-specific Languages in CSharp.pptx
+++ b/presentations/chadmyers/InternalDSLs/doc/Internal Domain-specific Languages in CSharp.pptx
@@ -12,21 +12,26 @@
     <p:sldId id="260" r:id="rId6"/>
     <p:sldId id="259" r:id="rId7"/>
     <p:sldId id="263" r:id="rId8"/>
-    <p:sldId id="262" r:id="rId9"/>
-    <p:sldId id="264" r:id="rId10"/>
-    <p:sldId id="269" r:id="rId11"/>
+    <p:sldId id="279" r:id="rId9"/>
+    <p:sldId id="262" r:id="rId10"/>
+    <p:sldId id="264" r:id="rId11"/>
     <p:sldId id="270" r:id="rId12"/>
     <p:sldId id="271" r:id="rId13"/>
     <p:sldId id="272" r:id="rId14"/>
     <p:sldId id="273" r:id="rId15"/>
     <p:sldId id="274" r:id="rId16"/>
     <p:sldId id="275" r:id="rId17"/>
-    <p:sldId id="265" r:id="rId18"/>
-    <p:sldId id="266" r:id="rId19"/>
-    <p:sldId id="268" r:id="rId20"/>
-    <p:sldId id="267" r:id="rId21"/>
-    <p:sldId id="278" r:id="rId22"/>
-    <p:sldId id="276" r:id="rId23"/>
+    <p:sldId id="280" r:id="rId18"/>
+    <p:sldId id="265" r:id="rId19"/>
+    <p:sldId id="266" r:id="rId20"/>
+    <p:sldId id="268" r:id="rId21"/>
+    <p:sldId id="267" r:id="rId22"/>
+    <p:sldId id="281" r:id="rId23"/>
+    <p:sldId id="276" r:id="rId24"/>
+    <p:sldId id="277" r:id="rId25"/>
+    <p:sldId id="278" r:id="rId26"/>
+    <p:sldId id="282" r:id="rId27"/>
+    <p:sldId id="283" r:id="rId28"/>
   </p:sldIdLst>
   <p:sldSz cx="9144000" cy="6858000" type="screen4x3"/>
   <p:notesSz cx="6858000" cy="9144000"/>
@@ -754,7 +759,7 @@
             <a:fld id="{5B190AD6-4DB3-4C5C-B19D-6B7C31FD5945}" type="datetimeFigureOut">
               <a:rPr lang="en-US" smtClean="0"/>
               <a:pPr/>
-              <a:t>10/28/2008</a:t>
+              <a:t>10/30/2008</a:t>
             </a:fld>
             <a:endParaRPr lang="en-US"/>
           </a:p>
@@ -952,7 +957,7 @@
             <a:fld id="{5B190AD6-4DB3-4C5C-B19D-6B7C31FD5945}" type="datetimeFigureOut">
               <a:rPr lang="en-US" smtClean="0"/>
               <a:pPr/>
-              <a:t>10/28/2008</a:t>
+              <a:t>10/30/2008</a:t>
             </a:fld>
             <a:endParaRPr lang="en-US"/>
           </a:p>
@@ -1139,7 +1144,7 @@
             <a:fld id="{5B190AD6-4DB3-4C5C-B19D-6B7C31FD5945}" type="datetimeFigureOut">
               <a:rPr lang="en-US" smtClean="0"/>
               <a:pPr/>
-              <a:t>10/28/2008</a:t>
+              <a:t>10/30/2008</a:t>
             </a:fld>
             <a:endParaRPr lang="en-US"/>
           </a:p>
@@ -1291,7 +1296,7 @@
             <a:fld id="{5B190AD6-4DB3-4C5C-B19D-6B7C31FD5945}" type="datetimeFigureOut">
               <a:rPr lang="en-US" smtClean="0"/>
               <a:pPr/>
-              <a:t>10/28/2008</a:t>
+              <a:t>10/30/2008</a:t>
             </a:fld>
             <a:endParaRPr lang="en-US"/>
           </a:p>
@@ -1548,7 +1553,7 @@
             <a:fld id="{5B190AD6-4DB3-4C5C-B19D-6B7C31FD5945}" type="datetimeFigureOut">
               <a:rPr lang="en-US" smtClean="0"/>
               <a:pPr/>
-              <a:t>10/28/2008</a:t>
+              <a:t>10/30/2008</a:t>
             </a:fld>
             <a:endParaRPr lang="en-US"/>
           </a:p>
@@ -1959,7 +1964,7 @@
             <a:fld id="{5B190AD6-4DB3-4C5C-B19D-6B7C31FD5945}" type="datetimeFigureOut">
               <a:rPr lang="en-US" smtClean="0"/>
               <a:pPr/>
-              <a:t>10/28/2008</a:t>
+              <a:t>10/30/2008</a:t>
             </a:fld>
             <a:endParaRPr lang="en-US"/>
           </a:p>
@@ -2407,7 +2412,7 @@
             <a:fld id="{5B190AD6-4DB3-4C5C-B19D-6B7C31FD5945}" type="datetimeFigureOut">
               <a:rPr lang="en-US" smtClean="0"/>
               <a:pPr/>
-              <a:t>10/28/2008</a:t>
+              <a:t>10/30/2008</a:t>
             </a:fld>
             <a:endParaRPr lang="en-US"/>
           </a:p>
@@ -2510,7 +2515,7 @@
             <a:fld id="{5B190AD6-4DB3-4C5C-B19D-6B7C31FD5945}" type="datetimeFigureOut">
               <a:rPr lang="en-US" smtClean="0"/>
               <a:pPr/>
-              <a:t>10/28/2008</a:t>
+              <a:t>10/30/2008</a:t>
             </a:fld>
             <a:endParaRPr lang="en-US"/>
           </a:p>
@@ -2633,7 +2638,7 @@
             <a:fld id="{5B190AD6-4DB3-4C5C-B19D-6B7C31FD5945}" type="datetimeFigureOut">
               <a:rPr lang="en-US" smtClean="0"/>
               <a:pPr/>
-              <a:t>10/28/2008</a:t>
+              <a:t>10/30/2008</a:t>
             </a:fld>
             <a:endParaRPr lang="en-US"/>
           </a:p>
@@ -2909,7 +2914,7 @@
             <a:fld id="{5B190AD6-4DB3-4C5C-B19D-6B7C31FD5945}" type="datetimeFigureOut">
               <a:rPr lang="en-US" smtClean="0"/>
               <a:pPr/>
-              <a:t>10/28/2008</a:t>
+              <a:t>10/30/2008</a:t>
             </a:fld>
             <a:endParaRPr lang="en-US"/>
           </a:p>
@@ -3116,7 +3121,7 @@
             <a:fld id="{5B190AD6-4DB3-4C5C-B19D-6B7C31FD5945}" type="datetimeFigureOut">
               <a:rPr lang="en-US" smtClean="0"/>
               <a:pPr/>
-              <a:t>10/28/2008</a:t>
+              <a:t>10/30/2008</a:t>
             </a:fld>
             <a:endParaRPr lang="en-US"/>
           </a:p>
@@ -4227,7 +4232,7 @@
             <a:fld id="{5B190AD6-4DB3-4C5C-B19D-6B7C31FD5945}" type="datetimeFigureOut">
               <a:rPr lang="en-US" smtClean="0"/>
               <a:pPr/>
-              <a:t>10/28/2008</a:t>
+              <a:t>10/30/2008</a:t>
             </a:fld>
             <a:endParaRPr lang="en-US"/>
           </a:p>
@@ -4715,7 +4720,58 @@
       </p:grpSpPr>
       <p:sp>
         <p:nvSpPr>
-          <p:cNvPr id="4" name="Title 3"/>
+          <p:cNvPr id="2" name="Content Placeholder 1"/>
+          <p:cNvSpPr>
+            <a:spLocks noGrp="1"/>
+          </p:cNvSpPr>
+          <p:nvPr>
+            <p:ph idx="1"/>
+          </p:nvPr>
+        </p:nvSpPr>
+        <p:spPr/>
+        <p:txBody>
+          <a:bodyPr/>
+          <a:lstStyle/>
+          <a:p>
+            <a:r>
+              <a:rPr lang="en-US" dirty="0" smtClean="0"/>
+              <a:t>Structural Patterns</a:t>
+            </a:r>
+          </a:p>
+          <a:p>
+            <a:pPr lvl="1"/>
+            <a:r>
+              <a:rPr lang="en-US" dirty="0" smtClean="0"/>
+              <a:t>Expression Builder</a:t>
+            </a:r>
+          </a:p>
+          <a:p>
+            <a:pPr lvl="1"/>
+            <a:r>
+              <a:rPr lang="en-US" dirty="0" smtClean="0"/>
+              <a:t>Object Scoping</a:t>
+            </a:r>
+          </a:p>
+          <a:p>
+            <a:pPr lvl="1"/>
+            <a:r>
+              <a:rPr lang="en-US" dirty="0" smtClean="0"/>
+              <a:t>Delegation (Nested Closures Revisited)</a:t>
+            </a:r>
+          </a:p>
+          <a:p>
+            <a:pPr lvl="1"/>
+            <a:r>
+              <a:rPr lang="en-US" dirty="0" smtClean="0"/>
+              <a:t>Convention</a:t>
+            </a:r>
+            <a:endParaRPr lang="en-US" dirty="0"/>
+          </a:p>
+        </p:txBody>
+      </p:sp>
+      <p:sp>
+        <p:nvSpPr>
+          <p:cNvPr id="3" name="Title 2"/>
           <p:cNvSpPr>
             <a:spLocks noGrp="1"/>
           </p:cNvSpPr>
@@ -4723,22 +4779,14 @@
             <p:ph type="title"/>
           </p:nvPr>
         </p:nvSpPr>
-        <p:spPr>
-          <a:xfrm>
-            <a:off x="2514600" y="2857500"/>
-            <a:ext cx="4114800" cy="1143000"/>
-          </a:xfrm>
-        </p:spPr>
-        <p:txBody>
-          <a:bodyPr>
-            <a:normAutofit fontScale="90000"/>
-          </a:bodyPr>
+        <p:spPr/>
+        <p:txBody>
+          <a:bodyPr/>
           <a:lstStyle/>
           <a:p>
-            <a:pPr algn="ctr"/>
-            <a:r>
-              <a:rPr lang="en-US" sz="7300" dirty="0" smtClean="0"/>
-              <a:t>Break</a:t>
+            <a:r>
+              <a:rPr lang="en-US" dirty="0" smtClean="0"/>
+              <a:t>Internal DSL Patterns</a:t>
             </a:r>
             <a:endParaRPr lang="en-US" dirty="0"/>
           </a:p>
@@ -4846,11 +4894,7 @@
             <a:pPr lvl="1"/>
             <a:r>
               <a:rPr lang="en-US" dirty="0" err="1" smtClean="0"/>
-              <a:t>System.</a:t>
-            </a:r>
-            <a:r>
-              <a:rPr lang="en-US" dirty="0" err="1" smtClean="0"/>
-              <a:t>String</a:t>
+              <a:t>System.String</a:t>
             </a:r>
             <a:endParaRPr lang="en-US" dirty="0"/>
           </a:p>
@@ -4927,11 +4971,7 @@
           <a:p>
             <a:r>
               <a:rPr lang="en-US" dirty="0" smtClean="0"/>
-              <a:t>Encapsulates Frequent </a:t>
-            </a:r>
-            <a:r>
-              <a:rPr lang="en-US" dirty="0" smtClean="0"/>
-              <a:t>Tasks</a:t>
+              <a:t>Encapsulates Frequent Tasks</a:t>
             </a:r>
           </a:p>
           <a:p>
@@ -5110,11 +5150,7 @@
             </a:r>
             <a:r>
               <a:rPr lang="en-US" dirty="0" smtClean="0"/>
-              <a:t> </a:t>
-            </a:r>
-            <a:r>
-              <a:rPr lang="en-US" dirty="0" smtClean="0"/>
-              <a:t>(Fluent </a:t>
+              <a:t> (Fluent </a:t>
             </a:r>
             <a:r>
               <a:rPr lang="en-US" dirty="0" err="1" smtClean="0"/>
@@ -5565,100 +5601,9 @@
           <a:p>
             <a:r>
               <a:rPr lang="en-US" dirty="0" smtClean="0"/>
-              <a:t>State Management</a:t>
-            </a:r>
-          </a:p>
-          <a:p>
-            <a:r>
-              <a:rPr lang="en-US" dirty="0" smtClean="0"/>
-              <a:t>Progressive Interfaces</a:t>
-            </a:r>
-          </a:p>
-          <a:p>
-            <a:r>
-              <a:rPr lang="en-US" dirty="0" smtClean="0"/>
-              <a:t>The “</a:t>
-            </a:r>
-            <a:r>
-              <a:rPr lang="en-US" dirty="0" err="1" smtClean="0"/>
-              <a:t>Rathole</a:t>
-            </a:r>
-            <a:r>
-              <a:rPr lang="en-US" dirty="0" smtClean="0"/>
-              <a:t>” </a:t>
-            </a:r>
-            <a:r>
-              <a:rPr lang="en-US" dirty="0" smtClean="0"/>
-              <a:t>Problem</a:t>
-            </a:r>
-          </a:p>
-          <a:p>
-            <a:r>
-              <a:rPr lang="en-US" dirty="0" smtClean="0"/>
-              <a:t>Examples: </a:t>
-            </a:r>
-          </a:p>
-          <a:p>
-            <a:pPr lvl="1"/>
-            <a:r>
-              <a:rPr lang="en-US" dirty="0" err="1" smtClean="0"/>
-              <a:t>CascadeExpression</a:t>
-            </a:r>
-            <a:r>
-              <a:rPr lang="en-US" dirty="0" smtClean="0"/>
-              <a:t> (Fluent </a:t>
-            </a:r>
-            <a:r>
-              <a:rPr lang="en-US" dirty="0" err="1" smtClean="0"/>
-              <a:t>Nhibernate</a:t>
-            </a:r>
-            <a:r>
-              <a:rPr lang="en-US" dirty="0" smtClean="0"/>
-              <a:t>)</a:t>
-            </a:r>
-          </a:p>
-          <a:p>
-            <a:pPr lvl="1"/>
-            <a:r>
-              <a:rPr lang="en-US" dirty="0" err="1" smtClean="0"/>
-              <a:t>ManyToManyPart</a:t>
-            </a:r>
-            <a:r>
-              <a:rPr lang="en-US" dirty="0" smtClean="0"/>
-              <a:t> (Fluent </a:t>
-            </a:r>
-            <a:r>
-              <a:rPr lang="en-US" dirty="0" err="1" smtClean="0"/>
-              <a:t>Nhibernate</a:t>
-            </a:r>
-            <a:r>
-              <a:rPr lang="en-US" dirty="0" smtClean="0"/>
-              <a:t>)</a:t>
-            </a:r>
-            <a:endParaRPr lang="en-US" dirty="0" smtClean="0"/>
-          </a:p>
-          <a:p>
-            <a:pPr lvl="1"/>
-            <a:r>
-              <a:rPr lang="en-US" dirty="0" err="1" smtClean="0"/>
-              <a:t>ActionLinkExpression</a:t>
-            </a:r>
-            <a:r>
-              <a:rPr lang="en-US" dirty="0" smtClean="0"/>
-              <a:t> (Dovetail)</a:t>
-            </a:r>
-          </a:p>
-          <a:p>
-            <a:pPr lvl="1"/>
-            <a:r>
-              <a:rPr lang="en-US" dirty="0" err="1" smtClean="0"/>
-              <a:t>ExpressionBase</a:t>
-            </a:r>
-            <a:r>
-              <a:rPr lang="en-US" dirty="0" smtClean="0"/>
-              <a:t> (Dovetail)</a:t>
-            </a:r>
-            <a:endParaRPr lang="en-US" dirty="0" smtClean="0"/>
+              <a:t>Any questions on building block patterns?</a:t>
+            </a:r>
+            <a:endParaRPr lang="en-US" dirty="0"/>
           </a:p>
         </p:txBody>
       </p:sp>
@@ -5674,14 +5619,12 @@
         </p:nvSpPr>
         <p:spPr/>
         <p:txBody>
-          <a:bodyPr>
-            <a:normAutofit/>
-          </a:bodyPr>
+          <a:bodyPr/>
           <a:lstStyle/>
           <a:p>
             <a:r>
               <a:rPr lang="en-US" dirty="0" smtClean="0"/>
-              <a:t>Expression Builder Pattern</a:t>
+              <a:t>Questions</a:t>
             </a:r>
             <a:endParaRPr lang="en-US" dirty="0"/>
           </a:p>
@@ -5729,47 +5672,40 @@
           <a:p>
             <a:r>
               <a:rPr lang="en-US" dirty="0" smtClean="0"/>
-              <a:t>Can be used directly, or serves as base class</a:t>
-            </a:r>
-          </a:p>
-          <a:p>
-            <a:r>
-              <a:rPr lang="en-US" dirty="0" smtClean="0"/>
-              <a:t>Contains starter methods</a:t>
-            </a:r>
-          </a:p>
-          <a:p>
-            <a:r>
-              <a:rPr lang="en-US" dirty="0" smtClean="0"/>
-              <a:t>Launching point for other patterns</a:t>
-            </a:r>
-          </a:p>
-          <a:p>
-            <a:r>
-              <a:rPr lang="en-US" dirty="0" smtClean="0"/>
-              <a:t>Examples:</a:t>
+              <a:t>State Management</a:t>
+            </a:r>
+          </a:p>
+          <a:p>
+            <a:r>
+              <a:rPr lang="en-US" dirty="0" smtClean="0"/>
+              <a:t>Progressive Interfaces</a:t>
+            </a:r>
+          </a:p>
+          <a:p>
+            <a:r>
+              <a:rPr lang="en-US" dirty="0" smtClean="0"/>
+              <a:t>The “</a:t>
+            </a:r>
+            <a:r>
+              <a:rPr lang="en-US" dirty="0" err="1" smtClean="0"/>
+              <a:t>Rathole</a:t>
+            </a:r>
+            <a:r>
+              <a:rPr lang="en-US" dirty="0" smtClean="0"/>
+              <a:t>” Problem</a:t>
+            </a:r>
+          </a:p>
+          <a:p>
+            <a:r>
+              <a:rPr lang="en-US" dirty="0" smtClean="0"/>
+              <a:t>Examples: </a:t>
             </a:r>
           </a:p>
           <a:p>
             <a:pPr lvl="1"/>
             <a:r>
-              <a:rPr lang="en-US" dirty="0" smtClean="0"/>
-              <a:t>Registry (</a:t>
-            </a:r>
-            <a:r>
               <a:rPr lang="en-US" dirty="0" err="1" smtClean="0"/>
-              <a:t>StructureMap</a:t>
-            </a:r>
-            <a:r>
-              <a:rPr lang="en-US" dirty="0" smtClean="0"/>
-              <a:t>)</a:t>
-            </a:r>
-          </a:p>
-          <a:p>
-            <a:pPr lvl="1"/>
-            <a:r>
-              <a:rPr lang="en-US" dirty="0" err="1" smtClean="0"/>
-              <a:t>PersistenceModel</a:t>
+              <a:t>CascadeExpression</a:t>
             </a:r>
             <a:r>
               <a:rPr lang="en-US" dirty="0" smtClean="0"/>
@@ -5783,7 +5719,47 @@
               <a:rPr lang="en-US" dirty="0" smtClean="0"/>
               <a:t>)</a:t>
             </a:r>
-            <a:endParaRPr lang="en-US" dirty="0"/>
+          </a:p>
+          <a:p>
+            <a:pPr lvl="1"/>
+            <a:r>
+              <a:rPr lang="en-US" dirty="0" err="1" smtClean="0"/>
+              <a:t>ManyToManyPart</a:t>
+            </a:r>
+            <a:r>
+              <a:rPr lang="en-US" dirty="0" smtClean="0"/>
+              <a:t> (Fluent </a:t>
+            </a:r>
+            <a:r>
+              <a:rPr lang="en-US" dirty="0" err="1" smtClean="0"/>
+              <a:t>Nhibernate</a:t>
+            </a:r>
+            <a:r>
+              <a:rPr lang="en-US" dirty="0" smtClean="0"/>
+              <a:t>)</a:t>
+            </a:r>
+          </a:p>
+          <a:p>
+            <a:pPr lvl="1"/>
+            <a:r>
+              <a:rPr lang="en-US" dirty="0" err="1" smtClean="0"/>
+              <a:t>ActionLinkExpression</a:t>
+            </a:r>
+            <a:r>
+              <a:rPr lang="en-US" dirty="0" smtClean="0"/>
+              <a:t> (Dovetail)</a:t>
+            </a:r>
+          </a:p>
+          <a:p>
+            <a:pPr lvl="1"/>
+            <a:r>
+              <a:rPr lang="en-US" dirty="0" err="1" smtClean="0"/>
+              <a:t>ExpressionBase</a:t>
+            </a:r>
+            <a:r>
+              <a:rPr lang="en-US" dirty="0" smtClean="0"/>
+              <a:t> (Dovetail)</a:t>
+            </a:r>
           </a:p>
         </p:txBody>
       </p:sp>
@@ -5799,12 +5775,14 @@
         </p:nvSpPr>
         <p:spPr/>
         <p:txBody>
-          <a:bodyPr/>
+          <a:bodyPr>
+            <a:normAutofit/>
+          </a:bodyPr>
           <a:lstStyle/>
           <a:p>
             <a:r>
               <a:rPr lang="en-US" dirty="0" smtClean="0"/>
-              <a:t>Object Scoping Pattern</a:t>
+              <a:t>Expression Builder Pattern</a:t>
             </a:r>
             <a:endParaRPr lang="en-US" dirty="0"/>
           </a:p>
@@ -5852,7 +5830,19 @@
           <a:p>
             <a:r>
               <a:rPr lang="en-US" dirty="0" smtClean="0"/>
-              <a:t>Can also be structural</a:t>
+              <a:t>Can be used directly, or serves as base class</a:t>
+            </a:r>
+          </a:p>
+          <a:p>
+            <a:r>
+              <a:rPr lang="en-US" dirty="0" smtClean="0"/>
+              <a:t>Contains starter methods</a:t>
+            </a:r>
+          </a:p>
+          <a:p>
+            <a:r>
+              <a:rPr lang="en-US" dirty="0" smtClean="0"/>
+              <a:t>Launching point for other patterns</a:t>
             </a:r>
           </a:p>
           <a:p>
@@ -5864,12 +5854,8 @@
           <a:p>
             <a:pPr lvl="1"/>
             <a:r>
-              <a:rPr lang="en-US" dirty="0" err="1" smtClean="0"/>
-              <a:t>ObjectFactory.Initialize</a:t>
-            </a:r>
-            <a:r>
-              <a:rPr lang="en-US" dirty="0" smtClean="0"/>
-              <a:t> (</a:t>
+              <a:rPr lang="en-US" dirty="0" smtClean="0"/>
+              <a:t>Registry (</a:t>
             </a:r>
             <a:r>
               <a:rPr lang="en-US" dirty="0" err="1" smtClean="0"/>
@@ -5879,6 +5865,25 @@
               <a:rPr lang="en-US" dirty="0" smtClean="0"/>
               <a:t>)</a:t>
             </a:r>
+          </a:p>
+          <a:p>
+            <a:pPr lvl="1"/>
+            <a:r>
+              <a:rPr lang="en-US" dirty="0" err="1" smtClean="0"/>
+              <a:t>PersistenceModel</a:t>
+            </a:r>
+            <a:r>
+              <a:rPr lang="en-US" dirty="0" smtClean="0"/>
+              <a:t> (Fluent </a:t>
+            </a:r>
+            <a:r>
+              <a:rPr lang="en-US" dirty="0" err="1" smtClean="0"/>
+              <a:t>Nhibernate</a:t>
+            </a:r>
+            <a:r>
+              <a:rPr lang="en-US" dirty="0" smtClean="0"/>
+              <a:t>)</a:t>
+            </a:r>
             <a:endParaRPr lang="en-US" dirty="0"/>
           </a:p>
         </p:txBody>
@@ -5900,7 +5905,7 @@
           <a:p>
             <a:r>
               <a:rPr lang="en-US" dirty="0" smtClean="0"/>
-              <a:t>Delegation (Nested Closures)</a:t>
+              <a:t>Object Scoping Pattern</a:t>
             </a:r>
             <a:endParaRPr lang="en-US" dirty="0"/>
           </a:p>
@@ -6037,19 +6042,7 @@
           <a:p>
             <a:r>
               <a:rPr lang="en-US" dirty="0" smtClean="0"/>
-              <a:t>Discovery of types</a:t>
-            </a:r>
-          </a:p>
-          <a:p>
-            <a:r>
-              <a:rPr lang="en-US" dirty="0" smtClean="0"/>
-              <a:t>Identification of interesting types</a:t>
-            </a:r>
-          </a:p>
-          <a:p>
-            <a:r>
-              <a:rPr lang="en-US" dirty="0" smtClean="0"/>
-              <a:t>Application</a:t>
+              <a:t>Can also be structural</a:t>
             </a:r>
           </a:p>
           <a:p>
@@ -6062,7 +6055,7 @@
             <a:pPr lvl="1"/>
             <a:r>
               <a:rPr lang="en-US" dirty="0" err="1" smtClean="0"/>
-              <a:t>ITypeScanner</a:t>
+              <a:t>ObjectFactory.Initialize</a:t>
             </a:r>
             <a:r>
               <a:rPr lang="en-US" dirty="0" smtClean="0"/>
@@ -6076,25 +6069,6 @@
               <a:rPr lang="en-US" dirty="0" smtClean="0"/>
               <a:t>)</a:t>
             </a:r>
-          </a:p>
-          <a:p>
-            <a:pPr lvl="1"/>
-            <a:r>
-              <a:rPr lang="en-US" dirty="0" err="1" smtClean="0"/>
-              <a:t>AutoPersistenceModel</a:t>
-            </a:r>
-            <a:r>
-              <a:rPr lang="en-US" dirty="0" smtClean="0"/>
-              <a:t> (Fluent </a:t>
-            </a:r>
-            <a:r>
-              <a:rPr lang="en-US" dirty="0" err="1" smtClean="0"/>
-              <a:t>Nhibernate</a:t>
-            </a:r>
-            <a:r>
-              <a:rPr lang="en-US" dirty="0" smtClean="0"/>
-              <a:t>)</a:t>
-            </a:r>
             <a:endParaRPr lang="en-US" dirty="0"/>
           </a:p>
         </p:txBody>
@@ -6116,7 +6090,7 @@
           <a:p>
             <a:r>
               <a:rPr lang="en-US" dirty="0" smtClean="0"/>
-              <a:t>Conventions</a:t>
+              <a:t>Delegation (Nested Closures)</a:t>
             </a:r>
             <a:endParaRPr lang="en-US" dirty="0"/>
           </a:p>
@@ -6149,7 +6123,86 @@
       </p:grpSpPr>
       <p:sp>
         <p:nvSpPr>
-          <p:cNvPr id="4" name="Title 3"/>
+          <p:cNvPr id="2" name="Content Placeholder 1"/>
+          <p:cNvSpPr>
+            <a:spLocks noGrp="1"/>
+          </p:cNvSpPr>
+          <p:nvPr>
+            <p:ph idx="1"/>
+          </p:nvPr>
+        </p:nvSpPr>
+        <p:spPr/>
+        <p:txBody>
+          <a:bodyPr/>
+          <a:lstStyle/>
+          <a:p>
+            <a:r>
+              <a:rPr lang="en-US" dirty="0" smtClean="0"/>
+              <a:t>Discovery of types</a:t>
+            </a:r>
+          </a:p>
+          <a:p>
+            <a:r>
+              <a:rPr lang="en-US" dirty="0" smtClean="0"/>
+              <a:t>Identification of interesting types</a:t>
+            </a:r>
+          </a:p>
+          <a:p>
+            <a:r>
+              <a:rPr lang="en-US" dirty="0" smtClean="0"/>
+              <a:t>Application</a:t>
+            </a:r>
+          </a:p>
+          <a:p>
+            <a:r>
+              <a:rPr lang="en-US" dirty="0" smtClean="0"/>
+              <a:t>Examples:</a:t>
+            </a:r>
+          </a:p>
+          <a:p>
+            <a:pPr lvl="1"/>
+            <a:r>
+              <a:rPr lang="en-US" dirty="0" err="1" smtClean="0"/>
+              <a:t>ITypeScanner</a:t>
+            </a:r>
+            <a:r>
+              <a:rPr lang="en-US" dirty="0" smtClean="0"/>
+              <a:t> (</a:t>
+            </a:r>
+            <a:r>
+              <a:rPr lang="en-US" dirty="0" err="1" smtClean="0"/>
+              <a:t>StructureMap</a:t>
+            </a:r>
+            <a:r>
+              <a:rPr lang="en-US" dirty="0" smtClean="0"/>
+              <a:t>)</a:t>
+            </a:r>
+          </a:p>
+          <a:p>
+            <a:pPr lvl="1"/>
+            <a:r>
+              <a:rPr lang="en-US" dirty="0" err="1" smtClean="0"/>
+              <a:t>AutoPersistenceModel</a:t>
+            </a:r>
+            <a:r>
+              <a:rPr lang="en-US" dirty="0" smtClean="0"/>
+              <a:t> (Fluent </a:t>
+            </a:r>
+            <a:r>
+              <a:rPr lang="en-US" dirty="0" err="1" smtClean="0"/>
+              <a:t>Nhibernate</a:t>
+            </a:r>
+            <a:r>
+              <a:rPr lang="en-US" dirty="0" smtClean="0"/>
+              <a:t>)</a:t>
+            </a:r>
+            <a:endParaRPr lang="en-US" dirty="0"/>
+          </a:p>
+        </p:txBody>
+      </p:sp>
+      <p:sp>
+        <p:nvSpPr>
+          <p:cNvPr id="3" name="Title 2"/>
           <p:cNvSpPr>
             <a:spLocks noGrp="1"/>
           </p:cNvSpPr>
@@ -6157,22 +6210,14 @@
             <p:ph type="title"/>
           </p:nvPr>
         </p:nvSpPr>
-        <p:spPr>
-          <a:xfrm>
-            <a:off x="2514600" y="2857500"/>
-            <a:ext cx="4114800" cy="1143000"/>
-          </a:xfrm>
-        </p:spPr>
-        <p:txBody>
-          <a:bodyPr>
-            <a:normAutofit fontScale="90000"/>
-          </a:bodyPr>
+        <p:spPr/>
+        <p:txBody>
+          <a:bodyPr/>
           <a:lstStyle/>
           <a:p>
-            <a:pPr algn="ctr"/>
-            <a:r>
-              <a:rPr lang="en-US" sz="7300" dirty="0" smtClean="0"/>
-              <a:t>Break</a:t>
+            <a:r>
+              <a:rPr lang="en-US" dirty="0" smtClean="0"/>
+              <a:t>Conventions</a:t>
             </a:r>
             <a:endParaRPr lang="en-US" dirty="0"/>
           </a:p>
@@ -6218,7 +6263,11 @@
           <a:bodyPr/>
           <a:lstStyle/>
           <a:p>
-            <a:endParaRPr lang="en-US"/>
+            <a:r>
+              <a:rPr lang="en-US" dirty="0" smtClean="0"/>
+              <a:t>Any questions on structural patterns?</a:t>
+            </a:r>
+            <a:endParaRPr lang="en-US" dirty="0"/>
           </a:p>
         </p:txBody>
       </p:sp>
@@ -6237,7 +6286,498 @@
           <a:bodyPr/>
           <a:lstStyle/>
           <a:p>
-            <a:endParaRPr lang="en-US"/>
+            <a:r>
+              <a:rPr lang="en-US" dirty="0" smtClean="0"/>
+              <a:t>Questions</a:t>
+            </a:r>
+            <a:endParaRPr lang="en-US" dirty="0"/>
+          </a:p>
+        </p:txBody>
+      </p:sp>
+    </p:spTree>
+  </p:cSld>
+  <p:clrMapOvr>
+    <a:masterClrMapping/>
+  </p:clrMapOvr>
+</p:sld>
+</file>
+
+<file path=ppt/slides/slide23.xml><?xml version="1.0" encoding="utf-8"?>
+<p:sld xmlns:a="http://schemas.openxmlformats.org/drawingml/2006/main" xmlns:r="http://schemas.openxmlformats.org/officeDocument/2006/relationships" xmlns:p="http://schemas.openxmlformats.org/presentationml/2006/main">
+  <p:cSld>
+    <p:spTree>
+      <p:nvGrpSpPr>
+        <p:cNvPr id="1" name=""/>
+        <p:cNvGrpSpPr/>
+        <p:nvPr/>
+      </p:nvGrpSpPr>
+      <p:grpSpPr>
+        <a:xfrm>
+          <a:off x="0" y="0"/>
+          <a:ext cx="0" cy="0"/>
+          <a:chOff x="0" y="0"/>
+          <a:chExt cx="0" cy="0"/>
+        </a:xfrm>
+      </p:grpSpPr>
+      <p:sp>
+        <p:nvSpPr>
+          <p:cNvPr id="2" name="Content Placeholder 1"/>
+          <p:cNvSpPr>
+            <a:spLocks noGrp="1"/>
+          </p:cNvSpPr>
+          <p:nvPr>
+            <p:ph idx="1"/>
+          </p:nvPr>
+        </p:nvSpPr>
+        <p:spPr/>
+        <p:txBody>
+          <a:bodyPr/>
+          <a:lstStyle/>
+          <a:p>
+            <a:r>
+              <a:rPr lang="en-US" dirty="0" smtClean="0"/>
+              <a:t>Build a model-based generative Internal DSL for writing a fairy tale story</a:t>
+            </a:r>
+          </a:p>
+          <a:p>
+            <a:r>
+              <a:rPr lang="en-US" dirty="0" smtClean="0"/>
+              <a:t>End result: Print the story to the debug window</a:t>
+            </a:r>
+            <a:endParaRPr lang="en-US" dirty="0"/>
+          </a:p>
+          <a:p>
+            <a:r>
+              <a:rPr lang="en-US" dirty="0" smtClean="0"/>
+              <a:t>Demonstrate as many patterns as possible in one DSL</a:t>
+            </a:r>
+          </a:p>
+        </p:txBody>
+      </p:sp>
+      <p:sp>
+        <p:nvSpPr>
+          <p:cNvPr id="3" name="Title 2"/>
+          <p:cNvSpPr>
+            <a:spLocks noGrp="1"/>
+          </p:cNvSpPr>
+          <p:nvPr>
+            <p:ph type="title"/>
+          </p:nvPr>
+        </p:nvSpPr>
+        <p:spPr/>
+        <p:txBody>
+          <a:bodyPr>
+            <a:normAutofit/>
+          </a:bodyPr>
+          <a:lstStyle/>
+          <a:p>
+            <a:r>
+              <a:rPr lang="en-US" dirty="0" smtClean="0"/>
+              <a:t>In Practice: Fairy Tale </a:t>
+            </a:r>
+            <a:r>
+              <a:rPr lang="en-US" dirty="0" smtClean="0"/>
+              <a:t>Builder</a:t>
+            </a:r>
+            <a:endParaRPr lang="en-US" dirty="0"/>
+          </a:p>
+        </p:txBody>
+      </p:sp>
+    </p:spTree>
+  </p:cSld>
+  <p:clrMapOvr>
+    <a:masterClrMapping/>
+  </p:clrMapOvr>
+</p:sld>
+</file>
+
+<file path=ppt/slides/slide24.xml><?xml version="1.0" encoding="utf-8"?>
+<p:sld xmlns:a="http://schemas.openxmlformats.org/drawingml/2006/main" xmlns:r="http://schemas.openxmlformats.org/officeDocument/2006/relationships" xmlns:p="http://schemas.openxmlformats.org/presentationml/2006/main">
+  <p:cSld>
+    <p:spTree>
+      <p:nvGrpSpPr>
+        <p:cNvPr id="1" name=""/>
+        <p:cNvGrpSpPr/>
+        <p:nvPr/>
+      </p:nvGrpSpPr>
+      <p:grpSpPr>
+        <a:xfrm>
+          <a:off x="0" y="0"/>
+          <a:ext cx="0" cy="0"/>
+          <a:chOff x="0" y="0"/>
+          <a:chExt cx="0" cy="0"/>
+        </a:xfrm>
+      </p:grpSpPr>
+      <p:sp>
+        <p:nvSpPr>
+          <p:cNvPr id="2" name="Content Placeholder 1"/>
+          <p:cNvSpPr>
+            <a:spLocks noGrp="1"/>
+          </p:cNvSpPr>
+          <p:nvPr>
+            <p:ph idx="1"/>
+          </p:nvPr>
+        </p:nvSpPr>
+        <p:spPr/>
+        <p:txBody>
+          <a:bodyPr/>
+          <a:lstStyle/>
+          <a:p>
+            <a:r>
+              <a:rPr lang="en-US" dirty="0" err="1" smtClean="0"/>
+              <a:t>FairyTale</a:t>
+            </a:r>
+            <a:r>
+              <a:rPr lang="en-US" dirty="0" smtClean="0"/>
+              <a:t> object</a:t>
+            </a:r>
+          </a:p>
+          <a:p>
+            <a:r>
+              <a:rPr lang="en-US" dirty="0" smtClean="0"/>
+              <a:t>Story Parts (Intro, focus, plot, ending)</a:t>
+            </a:r>
+          </a:p>
+          <a:p>
+            <a:r>
+              <a:rPr lang="en-US" dirty="0" smtClean="0"/>
+              <a:t>Rendering</a:t>
+            </a:r>
+            <a:endParaRPr lang="en-US" dirty="0"/>
+          </a:p>
+        </p:txBody>
+      </p:sp>
+      <p:sp>
+        <p:nvSpPr>
+          <p:cNvPr id="3" name="Title 2"/>
+          <p:cNvSpPr>
+            <a:spLocks noGrp="1"/>
+          </p:cNvSpPr>
+          <p:nvPr>
+            <p:ph type="title"/>
+          </p:nvPr>
+        </p:nvSpPr>
+        <p:spPr/>
+        <p:txBody>
+          <a:bodyPr>
+            <a:normAutofit/>
+          </a:bodyPr>
+          <a:lstStyle/>
+          <a:p>
+            <a:r>
+              <a:rPr lang="en-US" dirty="0" smtClean="0"/>
+              <a:t>Fairy Tale Model</a:t>
+            </a:r>
+            <a:endParaRPr lang="en-US" dirty="0"/>
+          </a:p>
+        </p:txBody>
+      </p:sp>
+    </p:spTree>
+  </p:cSld>
+  <p:clrMapOvr>
+    <a:masterClrMapping/>
+  </p:clrMapOvr>
+</p:sld>
+</file>
+
+<file path=ppt/slides/slide25.xml><?xml version="1.0" encoding="utf-8"?>
+<p:sld xmlns:a="http://schemas.openxmlformats.org/drawingml/2006/main" xmlns:r="http://schemas.openxmlformats.org/officeDocument/2006/relationships" xmlns:p="http://schemas.openxmlformats.org/presentationml/2006/main">
+  <p:cSld>
+    <p:spTree>
+      <p:nvGrpSpPr>
+        <p:cNvPr id="1" name=""/>
+        <p:cNvGrpSpPr/>
+        <p:nvPr/>
+      </p:nvGrpSpPr>
+      <p:grpSpPr>
+        <a:xfrm>
+          <a:off x="0" y="0"/>
+          <a:ext cx="0" cy="0"/>
+          <a:chOff x="0" y="0"/>
+          <a:chExt cx="0" cy="0"/>
+        </a:xfrm>
+      </p:grpSpPr>
+      <p:sp>
+        <p:nvSpPr>
+          <p:cNvPr id="2" name="Content Placeholder 1"/>
+          <p:cNvSpPr>
+            <a:spLocks noGrp="1"/>
+          </p:cNvSpPr>
+          <p:nvPr>
+            <p:ph idx="1"/>
+          </p:nvPr>
+        </p:nvSpPr>
+        <p:spPr/>
+        <p:txBody>
+          <a:bodyPr/>
+          <a:lstStyle/>
+          <a:p>
+            <a:r>
+              <a:rPr lang="en-US" dirty="0" smtClean="0"/>
+              <a:t>Delegation -- Nested Closure</a:t>
+            </a:r>
+          </a:p>
+          <a:p>
+            <a:r>
+              <a:rPr lang="en-US" dirty="0" smtClean="0"/>
+              <a:t>Expression Builder in closure</a:t>
+            </a:r>
+          </a:p>
+          <a:p>
+            <a:r>
+              <a:rPr lang="en-US" dirty="0" smtClean="0"/>
+              <a:t>Method Chaining with Generic Type </a:t>
+            </a:r>
+            <a:r>
+              <a:rPr lang="en-US" dirty="0" err="1" smtClean="0"/>
+              <a:t>Specifiers</a:t>
+            </a:r>
+            <a:endParaRPr lang="en-US" dirty="0" smtClean="0"/>
+          </a:p>
+          <a:p>
+            <a:r>
+              <a:rPr lang="en-US" dirty="0" smtClean="0"/>
+              <a:t>Literal Type Expressions</a:t>
+            </a:r>
+          </a:p>
+          <a:p>
+            <a:r>
+              <a:rPr lang="en-US" dirty="0" smtClean="0"/>
+              <a:t>Parse Tree Manipulation</a:t>
+            </a:r>
+          </a:p>
+          <a:p>
+            <a:r>
+              <a:rPr lang="en-US" dirty="0" smtClean="0"/>
+              <a:t>Dynamic Reception</a:t>
+            </a:r>
+          </a:p>
+          <a:p>
+            <a:endParaRPr lang="en-US" dirty="0"/>
+          </a:p>
+        </p:txBody>
+      </p:sp>
+      <p:sp>
+        <p:nvSpPr>
+          <p:cNvPr id="3" name="Title 2"/>
+          <p:cNvSpPr>
+            <a:spLocks noGrp="1"/>
+          </p:cNvSpPr>
+          <p:nvPr>
+            <p:ph type="title"/>
+          </p:nvPr>
+        </p:nvSpPr>
+        <p:spPr/>
+        <p:txBody>
+          <a:bodyPr/>
+          <a:lstStyle/>
+          <a:p>
+            <a:r>
+              <a:rPr lang="en-US" dirty="0" smtClean="0"/>
+              <a:t>Fairy Tale Builder</a:t>
+            </a:r>
+            <a:endParaRPr lang="en-US" dirty="0"/>
+          </a:p>
+        </p:txBody>
+      </p:sp>
+    </p:spTree>
+  </p:cSld>
+  <p:clrMapOvr>
+    <a:masterClrMapping/>
+  </p:clrMapOvr>
+</p:sld>
+</file>
+
+<file path=ppt/slides/slide26.xml><?xml version="1.0" encoding="utf-8"?>
+<p:sld xmlns:a="http://schemas.openxmlformats.org/drawingml/2006/main" xmlns:r="http://schemas.openxmlformats.org/officeDocument/2006/relationships" xmlns:p="http://schemas.openxmlformats.org/presentationml/2006/main">
+  <p:cSld>
+    <p:spTree>
+      <p:nvGrpSpPr>
+        <p:cNvPr id="1" name=""/>
+        <p:cNvGrpSpPr/>
+        <p:nvPr/>
+      </p:nvGrpSpPr>
+      <p:grpSpPr>
+        <a:xfrm>
+          <a:off x="0" y="0"/>
+          <a:ext cx="0" cy="0"/>
+          <a:chOff x="0" y="0"/>
+          <a:chExt cx="0" cy="0"/>
+        </a:xfrm>
+      </p:grpSpPr>
+      <p:sp>
+        <p:nvSpPr>
+          <p:cNvPr id="2" name="Content Placeholder 1"/>
+          <p:cNvSpPr>
+            <a:spLocks noGrp="1"/>
+          </p:cNvSpPr>
+          <p:nvPr>
+            <p:ph idx="1"/>
+          </p:nvPr>
+        </p:nvSpPr>
+        <p:spPr/>
+        <p:txBody>
+          <a:bodyPr/>
+          <a:lstStyle/>
+          <a:p>
+            <a:r>
+              <a:rPr lang="en-US" dirty="0" smtClean="0"/>
+              <a:t>Any questions on Fairy Tale Builder?</a:t>
+            </a:r>
+            <a:endParaRPr lang="en-US" dirty="0"/>
+          </a:p>
+        </p:txBody>
+      </p:sp>
+      <p:sp>
+        <p:nvSpPr>
+          <p:cNvPr id="3" name="Title 2"/>
+          <p:cNvSpPr>
+            <a:spLocks noGrp="1"/>
+          </p:cNvSpPr>
+          <p:nvPr>
+            <p:ph type="title"/>
+          </p:nvPr>
+        </p:nvSpPr>
+        <p:spPr/>
+        <p:txBody>
+          <a:bodyPr/>
+          <a:lstStyle/>
+          <a:p>
+            <a:r>
+              <a:rPr lang="en-US" dirty="0" smtClean="0"/>
+              <a:t>Questions</a:t>
+            </a:r>
+            <a:endParaRPr lang="en-US" dirty="0"/>
+          </a:p>
+        </p:txBody>
+      </p:sp>
+    </p:spTree>
+  </p:cSld>
+  <p:clrMapOvr>
+    <a:masterClrMapping/>
+  </p:clrMapOvr>
+</p:sld>
+</file>
+
+<file path=ppt/slides/slide27.xml><?xml version="1.0" encoding="utf-8"?>
+<p:sld xmlns:a="http://schemas.openxmlformats.org/drawingml/2006/main" xmlns:r="http://schemas.openxmlformats.org/officeDocument/2006/relationships" xmlns:p="http://schemas.openxmlformats.org/presentationml/2006/main">
+  <p:cSld>
+    <p:spTree>
+      <p:nvGrpSpPr>
+        <p:cNvPr id="1" name=""/>
+        <p:cNvGrpSpPr/>
+        <p:nvPr/>
+      </p:nvGrpSpPr>
+      <p:grpSpPr>
+        <a:xfrm>
+          <a:off x="0" y="0"/>
+          <a:ext cx="0" cy="0"/>
+          <a:chOff x="0" y="0"/>
+          <a:chExt cx="0" cy="0"/>
+        </a:xfrm>
+      </p:grpSpPr>
+      <p:sp>
+        <p:nvSpPr>
+          <p:cNvPr id="2" name="Content Placeholder 1"/>
+          <p:cNvSpPr>
+            <a:spLocks noGrp="1"/>
+          </p:cNvSpPr>
+          <p:nvPr>
+            <p:ph idx="1"/>
+          </p:nvPr>
+        </p:nvSpPr>
+        <p:spPr/>
+        <p:txBody>
+          <a:bodyPr/>
+          <a:lstStyle/>
+          <a:p>
+            <a:r>
+              <a:rPr lang="en-US" dirty="0" smtClean="0"/>
+              <a:t>Chad Myers</a:t>
+            </a:r>
+            <a:br>
+              <a:rPr lang="en-US" dirty="0" smtClean="0"/>
+            </a:br>
+            <a:r>
+              <a:rPr lang="en-US" dirty="0" smtClean="0">
+                <a:hlinkClick r:id="rId2"/>
+              </a:rPr>
+              <a:t>chad@chadmyers.com</a:t>
+            </a:r>
+            <a:r>
+              <a:rPr lang="en-US" dirty="0" smtClean="0"/>
+              <a:t/>
+            </a:r>
+            <a:br>
+              <a:rPr lang="en-US" dirty="0" smtClean="0"/>
+            </a:br>
+            <a:r>
+              <a:rPr lang="en-US" dirty="0" smtClean="0"/>
+              <a:t/>
+            </a:r>
+            <a:br>
+              <a:rPr lang="en-US" dirty="0" smtClean="0"/>
+            </a:br>
+            <a:r>
+              <a:rPr lang="en-US" dirty="0" smtClean="0">
+                <a:hlinkClick r:id="rId3"/>
+              </a:rPr>
+              <a:t>http://chadmyers.lostechies.com</a:t>
+            </a:r>
+            <a:r>
+              <a:rPr lang="en-US" dirty="0" smtClean="0"/>
+              <a:t/>
+            </a:r>
+            <a:br>
+              <a:rPr lang="en-US" dirty="0" smtClean="0"/>
+            </a:br>
+            <a:endParaRPr lang="en-US" dirty="0" smtClean="0"/>
+          </a:p>
+          <a:p>
+            <a:r>
+              <a:rPr lang="en-US" dirty="0" smtClean="0"/>
+              <a:t>Martin Fowler’s DSL WIP</a:t>
+            </a:r>
+            <a:br>
+              <a:rPr lang="en-US" dirty="0" smtClean="0"/>
+            </a:br>
+            <a:r>
+              <a:rPr lang="en-US" dirty="0" smtClean="0">
+                <a:hlinkClick r:id="rId4"/>
+              </a:rPr>
+              <a:t>http://martinfowler.com/dslwip</a:t>
+            </a:r>
+            <a:r>
+              <a:rPr lang="en-US" dirty="0" smtClean="0"/>
+              <a:t/>
+            </a:r>
+            <a:br>
+              <a:rPr lang="en-US" dirty="0" smtClean="0"/>
+            </a:br>
+            <a:endParaRPr lang="en-US" dirty="0"/>
+          </a:p>
+        </p:txBody>
+      </p:sp>
+      <p:sp>
+        <p:nvSpPr>
+          <p:cNvPr id="3" name="Title 2"/>
+          <p:cNvSpPr>
+            <a:spLocks noGrp="1"/>
+          </p:cNvSpPr>
+          <p:nvPr>
+            <p:ph type="title"/>
+          </p:nvPr>
+        </p:nvSpPr>
+        <p:spPr/>
+        <p:txBody>
+          <a:bodyPr/>
+          <a:lstStyle/>
+          <a:p>
+            <a:r>
+              <a:rPr lang="en-US" dirty="0" smtClean="0"/>
+              <a:t>Closing</a:t>
+            </a:r>
+            <a:endParaRPr lang="en-US" dirty="0"/>
           </a:p>
         </p:txBody>
       </p:sp>
@@ -6911,69 +7451,7 @@
           <a:p>
             <a:r>
               <a:rPr lang="en-US" dirty="0" smtClean="0"/>
-              <a:t>Building Block Concepts</a:t>
-            </a:r>
-          </a:p>
-          <a:p>
-            <a:pPr lvl="1"/>
-            <a:r>
-              <a:rPr lang="en-US" dirty="0" smtClean="0"/>
-              <a:t>Context Variables and State Management</a:t>
-            </a:r>
-          </a:p>
-          <a:p>
-            <a:pPr lvl="1"/>
-            <a:r>
-              <a:rPr lang="en-US" dirty="0" smtClean="0"/>
-              <a:t>Generic Type Specifiers</a:t>
-            </a:r>
-          </a:p>
-          <a:p>
-            <a:r>
-              <a:rPr lang="en-US" dirty="0" smtClean="0"/>
-              <a:t>Building Block Patterns</a:t>
-            </a:r>
-          </a:p>
-          <a:p>
-            <a:pPr lvl="1"/>
-            <a:r>
-              <a:rPr lang="en-US" dirty="0" smtClean="0"/>
-              <a:t>Method Chaining</a:t>
-            </a:r>
-          </a:p>
-          <a:p>
-            <a:pPr lvl="1"/>
-            <a:r>
-              <a:rPr lang="en-US" dirty="0" smtClean="0"/>
-              <a:t>Nested Function</a:t>
-            </a:r>
-          </a:p>
-          <a:p>
-            <a:pPr lvl="1"/>
-            <a:r>
-              <a:rPr lang="en-US" dirty="0" smtClean="0"/>
-              <a:t>Nested Closure</a:t>
-            </a:r>
-          </a:p>
-          <a:p>
-            <a:pPr lvl="1"/>
-            <a:r>
-              <a:rPr lang="en-US" dirty="0" smtClean="0"/>
-              <a:t>Literal Type/Collection Expression (Initializers)</a:t>
-            </a:r>
-          </a:p>
-          <a:p>
-            <a:pPr lvl="1"/>
-            <a:r>
-              <a:rPr lang="en-US" dirty="0" smtClean="0"/>
-              <a:t>Dynamic Reception (Extension Methods)</a:t>
-            </a:r>
-          </a:p>
-          <a:p>
-            <a:pPr lvl="1"/>
-            <a:r>
-              <a:rPr lang="en-US" dirty="0" smtClean="0"/>
-              <a:t>Parse Tree Manipulation (Expression Trees)</a:t>
+              <a:t>Before we get into the meat, any questions?</a:t>
             </a:r>
             <a:endParaRPr lang="en-US" dirty="0"/>
           </a:p>
@@ -6996,7 +7474,7 @@
           <a:p>
             <a:r>
               <a:rPr lang="en-US" dirty="0" smtClean="0"/>
-              <a:t>Internal DSL Patterns</a:t>
+              <a:t>Questions Here</a:t>
             </a:r>
             <a:endParaRPr lang="en-US" dirty="0"/>
           </a:p>
@@ -7044,40 +7522,69 @@
           <a:p>
             <a:r>
               <a:rPr lang="en-US" dirty="0" smtClean="0"/>
-              <a:t>Structural Patterns</a:t>
+              <a:t>Building Block Concepts</a:t>
             </a:r>
           </a:p>
           <a:p>
             <a:pPr lvl="1"/>
             <a:r>
               <a:rPr lang="en-US" dirty="0" smtClean="0"/>
-              <a:t>Expression Builder</a:t>
+              <a:t>Context Variables and State Management</a:t>
             </a:r>
           </a:p>
           <a:p>
             <a:pPr lvl="1"/>
             <a:r>
               <a:rPr lang="en-US" dirty="0" smtClean="0"/>
-              <a:t>Object </a:t>
-            </a:r>
-            <a:r>
-              <a:rPr lang="en-US" dirty="0" smtClean="0"/>
-              <a:t>Scoping</a:t>
+              <a:t>Generic Type Specifiers</a:t>
+            </a:r>
+          </a:p>
+          <a:p>
+            <a:r>
+              <a:rPr lang="en-US" dirty="0" smtClean="0"/>
+              <a:t>Building Block Patterns</a:t>
             </a:r>
           </a:p>
           <a:p>
             <a:pPr lvl="1"/>
             <a:r>
               <a:rPr lang="en-US" dirty="0" smtClean="0"/>
-              <a:t>Delegation (Nested Closures Revisited)</a:t>
-            </a:r>
-            <a:endParaRPr lang="en-US" dirty="0" smtClean="0"/>
+              <a:t>Method Chaining</a:t>
+            </a:r>
           </a:p>
           <a:p>
             <a:pPr lvl="1"/>
             <a:r>
               <a:rPr lang="en-US" dirty="0" smtClean="0"/>
-              <a:t>Convention</a:t>
+              <a:t>Nested Function</a:t>
+            </a:r>
+          </a:p>
+          <a:p>
+            <a:pPr lvl="1"/>
+            <a:r>
+              <a:rPr lang="en-US" dirty="0" smtClean="0"/>
+              <a:t>Nested Closure</a:t>
+            </a:r>
+          </a:p>
+          <a:p>
+            <a:pPr lvl="1"/>
+            <a:r>
+              <a:rPr lang="en-US" dirty="0" smtClean="0"/>
+              <a:t>Literal Type/Collection Expression (Initializers)</a:t>
+            </a:r>
+          </a:p>
+          <a:p>
+            <a:pPr lvl="1"/>
+            <a:r>
+              <a:rPr lang="en-US" dirty="0" smtClean="0"/>
+              <a:t>Dynamic Reception (Extension Methods)</a:t>
+            </a:r>
+          </a:p>
+          <a:p>
+            <a:pPr lvl="1"/>
+            <a:r>
+              <a:rPr lang="en-US" dirty="0" smtClean="0"/>
+              <a:t>Parse Tree Manipulation (Expression Trees)</a:t>
             </a:r>
             <a:endParaRPr lang="en-US" dirty="0"/>
           </a:p>

</xml_diff>